<commit_message>
update SLIDE Báo cáo đồ án tốt nghiệp.pptx
</commit_message>
<xml_diff>
--- a/BAO CAO/SLIDE Báo cáo đồ án tốt nghiệp.pptx
+++ b/BAO CAO/SLIDE Báo cáo đồ án tốt nghiệp.pptx
@@ -19,6 +19,8 @@
     <p:sldId id="268" r:id="rId13"/>
     <p:sldId id="269" r:id="rId14"/>
     <p:sldId id="270" r:id="rId15"/>
+    <p:sldId id="272" r:id="rId16"/>
+    <p:sldId id="273" r:id="rId17"/>
   </p:sldIdLst>
   <p:sldSz cx="12192000" cy="6858000"/>
   <p:notesSz cx="6858000" cy="9144000"/>
@@ -313,7 +315,7 @@
           <a:p>
             <a:fld id="{48A87A34-81AB-432B-8DAE-1953F412C126}" type="datetimeFigureOut">
               <a:rPr lang="en-US" smtClean="0"/>
-              <a:t>5/16/2019</a:t>
+              <a:t>5/17/2019</a:t>
             </a:fld>
             <a:endParaRPr lang="en-US" dirty="0"/>
           </a:p>
@@ -652,7 +654,7 @@
             <a:fld id="{48A87A34-81AB-432B-8DAE-1953F412C126}" type="datetimeFigureOut">
               <a:rPr lang="en-US" smtClean="0"/>
               <a:pPr/>
-              <a:t>5/16/2019</a:t>
+              <a:t>5/17/2019</a:t>
             </a:fld>
             <a:endParaRPr lang="en-US" dirty="0"/>
           </a:p>
@@ -1055,7 +1057,7 @@
             <a:fld id="{48A87A34-81AB-432B-8DAE-1953F412C126}" type="datetimeFigureOut">
               <a:rPr lang="en-US" smtClean="0"/>
               <a:pPr/>
-              <a:t>5/16/2019</a:t>
+              <a:t>5/17/2019</a:t>
             </a:fld>
             <a:endParaRPr lang="en-US" dirty="0"/>
           </a:p>
@@ -1393,7 +1395,7 @@
             <a:fld id="{48A87A34-81AB-432B-8DAE-1953F412C126}" type="datetimeFigureOut">
               <a:rPr lang="en-US" smtClean="0"/>
               <a:pPr/>
-              <a:t>5/16/2019</a:t>
+              <a:t>5/17/2019</a:t>
             </a:fld>
             <a:endParaRPr lang="en-US" dirty="0"/>
           </a:p>
@@ -1715,7 +1717,7 @@
             <a:fld id="{48A87A34-81AB-432B-8DAE-1953F412C126}" type="datetimeFigureOut">
               <a:rPr lang="en-US" smtClean="0"/>
               <a:pPr/>
-              <a:t>5/16/2019</a:t>
+              <a:t>5/17/2019</a:t>
             </a:fld>
             <a:endParaRPr lang="en-US" dirty="0"/>
           </a:p>
@@ -2113,7 +2115,7 @@
             <a:fld id="{48A87A34-81AB-432B-8DAE-1953F412C126}" type="datetimeFigureOut">
               <a:rPr lang="en-US" smtClean="0"/>
               <a:pPr/>
-              <a:t>5/16/2019</a:t>
+              <a:t>5/17/2019</a:t>
             </a:fld>
             <a:endParaRPr lang="en-US" dirty="0"/>
           </a:p>
@@ -2371,7 +2373,7 @@
           <a:p>
             <a:fld id="{48A87A34-81AB-432B-8DAE-1953F412C126}" type="datetimeFigureOut">
               <a:rPr lang="en-US" smtClean="0"/>
-              <a:t>5/16/2019</a:t>
+              <a:t>5/17/2019</a:t>
             </a:fld>
             <a:endParaRPr lang="en-US" dirty="0"/>
           </a:p>
@@ -2633,7 +2635,7 @@
           <a:p>
             <a:fld id="{48A87A34-81AB-432B-8DAE-1953F412C126}" type="datetimeFigureOut">
               <a:rPr lang="en-US" smtClean="0"/>
-              <a:t>5/16/2019</a:t>
+              <a:t>5/17/2019</a:t>
             </a:fld>
             <a:endParaRPr lang="en-US" dirty="0"/>
           </a:p>
@@ -2895,7 +2897,7 @@
           <a:p>
             <a:fld id="{48A87A34-81AB-432B-8DAE-1953F412C126}" type="datetimeFigureOut">
               <a:rPr lang="en-US" smtClean="0"/>
-              <a:t>5/16/2019</a:t>
+              <a:t>5/17/2019</a:t>
             </a:fld>
             <a:endParaRPr lang="en-US" dirty="0"/>
           </a:p>
@@ -3224,7 +3226,7 @@
           <a:p>
             <a:fld id="{48A87A34-81AB-432B-8DAE-1953F412C126}" type="datetimeFigureOut">
               <a:rPr lang="en-US" smtClean="0"/>
-              <a:t>5/16/2019</a:t>
+              <a:t>5/17/2019</a:t>
             </a:fld>
             <a:endParaRPr lang="en-US" dirty="0"/>
           </a:p>
@@ -3547,7 +3549,7 @@
           <a:p>
             <a:fld id="{48A87A34-81AB-432B-8DAE-1953F412C126}" type="datetimeFigureOut">
               <a:rPr lang="en-US" smtClean="0"/>
-              <a:t>5/16/2019</a:t>
+              <a:t>5/17/2019</a:t>
             </a:fld>
             <a:endParaRPr lang="en-US" dirty="0"/>
           </a:p>
@@ -4004,7 +4006,7 @@
           <a:p>
             <a:fld id="{48A87A34-81AB-432B-8DAE-1953F412C126}" type="datetimeFigureOut">
               <a:rPr lang="en-US" smtClean="0"/>
-              <a:t>5/16/2019</a:t>
+              <a:t>5/17/2019</a:t>
             </a:fld>
             <a:endParaRPr lang="en-US" dirty="0"/>
           </a:p>
@@ -4209,7 +4211,7 @@
           <a:p>
             <a:fld id="{48A87A34-81AB-432B-8DAE-1953F412C126}" type="datetimeFigureOut">
               <a:rPr lang="en-US" smtClean="0"/>
-              <a:t>5/16/2019</a:t>
+              <a:t>5/17/2019</a:t>
             </a:fld>
             <a:endParaRPr lang="en-US" dirty="0"/>
           </a:p>
@@ -4386,7 +4388,7 @@
           <a:p>
             <a:fld id="{48A87A34-81AB-432B-8DAE-1953F412C126}" type="datetimeFigureOut">
               <a:rPr lang="en-US" smtClean="0"/>
-              <a:t>5/16/2019</a:t>
+              <a:t>5/17/2019</a:t>
             </a:fld>
             <a:endParaRPr lang="en-US" dirty="0"/>
           </a:p>
@@ -4719,7 +4721,7 @@
           <a:p>
             <a:fld id="{48A87A34-81AB-432B-8DAE-1953F412C126}" type="datetimeFigureOut">
               <a:rPr lang="en-US" smtClean="0"/>
-              <a:t>5/16/2019</a:t>
+              <a:t>5/17/2019</a:t>
             </a:fld>
             <a:endParaRPr lang="en-US" dirty="0"/>
           </a:p>
@@ -5064,7 +5066,7 @@
           <a:p>
             <a:fld id="{48A87A34-81AB-432B-8DAE-1953F412C126}" type="datetimeFigureOut">
               <a:rPr lang="en-US" smtClean="0"/>
-              <a:t>5/16/2019</a:t>
+              <a:t>5/17/2019</a:t>
             </a:fld>
             <a:endParaRPr lang="en-US" dirty="0"/>
           </a:p>
@@ -7182,7 +7184,7 @@
             <a:fld id="{48A87A34-81AB-432B-8DAE-1953F412C126}" type="datetimeFigureOut">
               <a:rPr lang="en-US" smtClean="0"/>
               <a:pPr/>
-              <a:t>5/16/2019</a:t>
+              <a:t>5/17/2019</a:t>
             </a:fld>
             <a:endParaRPr lang="en-US" dirty="0"/>
           </a:p>
@@ -9774,6 +9776,2881 @@
 </p:sld>
 </file>
 
+<file path=ppt/slides/slide15.xml><?xml version="1.0" encoding="utf-8"?>
+<p:sld xmlns:a="http://schemas.openxmlformats.org/drawingml/2006/main" xmlns:r="http://schemas.openxmlformats.org/officeDocument/2006/relationships" xmlns:p="http://schemas.openxmlformats.org/presentationml/2006/main">
+  <p:cSld>
+    <p:spTree>
+      <p:nvGrpSpPr>
+        <p:cNvPr id="1" name=""/>
+        <p:cNvGrpSpPr/>
+        <p:nvPr/>
+      </p:nvGrpSpPr>
+      <p:grpSpPr>
+        <a:xfrm>
+          <a:off x="0" y="0"/>
+          <a:ext cx="0" cy="0"/>
+          <a:chOff x="0" y="0"/>
+          <a:chExt cx="0" cy="0"/>
+        </a:xfrm>
+      </p:grpSpPr>
+      <p:sp>
+        <p:nvSpPr>
+          <p:cNvPr id="2" name="Title 1">
+            <a:extLst>
+              <a:ext uri="{FF2B5EF4-FFF2-40B4-BE49-F238E27FC236}">
+                <a16:creationId xmlns:a16="http://schemas.microsoft.com/office/drawing/2014/main" id="{16719C43-EC8A-4F91-B2B8-467EE9E0364C}"/>
+              </a:ext>
+            </a:extLst>
+          </p:cNvPr>
+          <p:cNvSpPr>
+            <a:spLocks noGrp="1"/>
+          </p:cNvSpPr>
+          <p:nvPr>
+            <p:ph type="ctrTitle"/>
+          </p:nvPr>
+        </p:nvSpPr>
+        <p:spPr>
+          <a:xfrm>
+            <a:off x="2379764" y="492062"/>
+            <a:ext cx="8791575" cy="924551"/>
+          </a:xfrm>
+        </p:spPr>
+        <p:txBody>
+          <a:bodyPr>
+            <a:normAutofit/>
+          </a:bodyPr>
+          <a:lstStyle/>
+          <a:p>
+            <a:pPr algn="ctr"/>
+            <a:r>
+              <a:rPr lang="en-US" sz="4000" b="1" dirty="0" err="1">
+                <a:latin typeface="Times New Roman" panose="02020603050405020304" pitchFamily="18" charset="0"/>
+                <a:cs typeface="Times New Roman" panose="02020603050405020304" pitchFamily="18" charset="0"/>
+              </a:rPr>
+              <a:t>Kết</a:t>
+            </a:r>
+            <a:r>
+              <a:rPr lang="en-US" sz="4000" b="1" dirty="0">
+                <a:latin typeface="Times New Roman" panose="02020603050405020304" pitchFamily="18" charset="0"/>
+                <a:cs typeface="Times New Roman" panose="02020603050405020304" pitchFamily="18" charset="0"/>
+              </a:rPr>
+              <a:t> </a:t>
+            </a:r>
+            <a:r>
+              <a:rPr lang="en-US" sz="4000" b="1" dirty="0" err="1">
+                <a:latin typeface="Times New Roman" panose="02020603050405020304" pitchFamily="18" charset="0"/>
+                <a:cs typeface="Times New Roman" panose="02020603050405020304" pitchFamily="18" charset="0"/>
+              </a:rPr>
+              <a:t>luận</a:t>
+            </a:r>
+            <a:endParaRPr lang="en-US" sz="4000" b="1" dirty="0">
+              <a:latin typeface="Times New Roman" panose="02020603050405020304" pitchFamily="18" charset="0"/>
+              <a:cs typeface="Times New Roman" panose="02020603050405020304" pitchFamily="18" charset="0"/>
+            </a:endParaRPr>
+          </a:p>
+        </p:txBody>
+      </p:sp>
+      <p:sp>
+        <p:nvSpPr>
+          <p:cNvPr id="3" name="Subtitle 2">
+            <a:extLst>
+              <a:ext uri="{FF2B5EF4-FFF2-40B4-BE49-F238E27FC236}">
+                <a16:creationId xmlns:a16="http://schemas.microsoft.com/office/drawing/2014/main" id="{E0B6DE87-722A-48C1-813D-624EA3268C53}"/>
+              </a:ext>
+            </a:extLst>
+          </p:cNvPr>
+          <p:cNvSpPr>
+            <a:spLocks noGrp="1"/>
+          </p:cNvSpPr>
+          <p:nvPr>
+            <p:ph type="subTitle" idx="1"/>
+          </p:nvPr>
+        </p:nvSpPr>
+        <p:spPr>
+          <a:xfrm>
+            <a:off x="2019300" y="1744910"/>
+            <a:ext cx="9152039" cy="4986090"/>
+          </a:xfrm>
+        </p:spPr>
+        <p:txBody>
+          <a:bodyPr>
+            <a:normAutofit/>
+          </a:bodyPr>
+          <a:lstStyle/>
+          <a:p>
+            <a:r>
+              <a:rPr lang="en-US" sz="2800" b="1" dirty="0" err="1">
+                <a:solidFill>
+                  <a:schemeClr val="tx1"/>
+                </a:solidFill>
+                <a:latin typeface="Times New Roman" panose="02020603050405020304" pitchFamily="18" charset="0"/>
+                <a:cs typeface="Times New Roman" panose="02020603050405020304" pitchFamily="18" charset="0"/>
+              </a:rPr>
+              <a:t>Các</a:t>
+            </a:r>
+            <a:r>
+              <a:rPr lang="en-US" sz="2800" b="1" dirty="0">
+                <a:solidFill>
+                  <a:schemeClr val="tx1"/>
+                </a:solidFill>
+                <a:latin typeface="Times New Roman" panose="02020603050405020304" pitchFamily="18" charset="0"/>
+                <a:cs typeface="Times New Roman" panose="02020603050405020304" pitchFamily="18" charset="0"/>
+              </a:rPr>
+              <a:t> </a:t>
+            </a:r>
+            <a:r>
+              <a:rPr lang="en-US" sz="2800" b="1" dirty="0" err="1">
+                <a:solidFill>
+                  <a:schemeClr val="tx1"/>
+                </a:solidFill>
+                <a:latin typeface="Times New Roman" panose="02020603050405020304" pitchFamily="18" charset="0"/>
+                <a:cs typeface="Times New Roman" panose="02020603050405020304" pitchFamily="18" charset="0"/>
+              </a:rPr>
+              <a:t>vấn</a:t>
+            </a:r>
+            <a:r>
+              <a:rPr lang="en-US" sz="2800" b="1" dirty="0">
+                <a:solidFill>
+                  <a:schemeClr val="tx1"/>
+                </a:solidFill>
+                <a:latin typeface="Times New Roman" panose="02020603050405020304" pitchFamily="18" charset="0"/>
+                <a:cs typeface="Times New Roman" panose="02020603050405020304" pitchFamily="18" charset="0"/>
+              </a:rPr>
+              <a:t> </a:t>
+            </a:r>
+            <a:r>
+              <a:rPr lang="en-US" sz="2800" b="1" dirty="0" err="1">
+                <a:solidFill>
+                  <a:schemeClr val="tx1"/>
+                </a:solidFill>
+                <a:latin typeface="Times New Roman" panose="02020603050405020304" pitchFamily="18" charset="0"/>
+                <a:cs typeface="Times New Roman" panose="02020603050405020304" pitchFamily="18" charset="0"/>
+              </a:rPr>
+              <a:t>đề</a:t>
+            </a:r>
+            <a:r>
+              <a:rPr lang="en-US" sz="2800" b="1" dirty="0">
+                <a:solidFill>
+                  <a:schemeClr val="tx1"/>
+                </a:solidFill>
+                <a:latin typeface="Times New Roman" panose="02020603050405020304" pitchFamily="18" charset="0"/>
+                <a:cs typeface="Times New Roman" panose="02020603050405020304" pitchFamily="18" charset="0"/>
+              </a:rPr>
+              <a:t> </a:t>
+            </a:r>
+            <a:r>
+              <a:rPr lang="en-US" sz="2800" b="1" dirty="0" err="1">
+                <a:solidFill>
+                  <a:schemeClr val="tx1"/>
+                </a:solidFill>
+                <a:latin typeface="Times New Roman" panose="02020603050405020304" pitchFamily="18" charset="0"/>
+                <a:cs typeface="Times New Roman" panose="02020603050405020304" pitchFamily="18" charset="0"/>
+              </a:rPr>
+              <a:t>tồn</a:t>
+            </a:r>
+            <a:r>
+              <a:rPr lang="en-US" sz="2800" b="1" dirty="0">
+                <a:solidFill>
+                  <a:schemeClr val="tx1"/>
+                </a:solidFill>
+                <a:latin typeface="Times New Roman" panose="02020603050405020304" pitchFamily="18" charset="0"/>
+                <a:cs typeface="Times New Roman" panose="02020603050405020304" pitchFamily="18" charset="0"/>
+              </a:rPr>
+              <a:t> </a:t>
+            </a:r>
+            <a:r>
+              <a:rPr lang="en-US" sz="2800" b="1" dirty="0" err="1">
+                <a:solidFill>
+                  <a:schemeClr val="tx1"/>
+                </a:solidFill>
+                <a:latin typeface="Times New Roman" panose="02020603050405020304" pitchFamily="18" charset="0"/>
+                <a:cs typeface="Times New Roman" panose="02020603050405020304" pitchFamily="18" charset="0"/>
+              </a:rPr>
+              <a:t>đọng</a:t>
+            </a:r>
+            <a:r>
+              <a:rPr lang="en-US" sz="2800" b="1" dirty="0">
+                <a:solidFill>
+                  <a:schemeClr val="tx1"/>
+                </a:solidFill>
+                <a:latin typeface="Times New Roman" panose="02020603050405020304" pitchFamily="18" charset="0"/>
+                <a:cs typeface="Times New Roman" panose="02020603050405020304" pitchFamily="18" charset="0"/>
+              </a:rPr>
+              <a:t> </a:t>
+            </a:r>
+            <a:r>
+              <a:rPr lang="en-US" sz="2800" b="1" dirty="0" err="1">
+                <a:solidFill>
+                  <a:schemeClr val="tx1"/>
+                </a:solidFill>
+                <a:latin typeface="Times New Roman" panose="02020603050405020304" pitchFamily="18" charset="0"/>
+                <a:cs typeface="Times New Roman" panose="02020603050405020304" pitchFamily="18" charset="0"/>
+              </a:rPr>
+              <a:t>của</a:t>
+            </a:r>
+            <a:r>
+              <a:rPr lang="en-US" sz="2800" b="1" dirty="0">
+                <a:solidFill>
+                  <a:schemeClr val="tx1"/>
+                </a:solidFill>
+                <a:latin typeface="Times New Roman" panose="02020603050405020304" pitchFamily="18" charset="0"/>
+                <a:cs typeface="Times New Roman" panose="02020603050405020304" pitchFamily="18" charset="0"/>
+              </a:rPr>
+              <a:t> </a:t>
+            </a:r>
+            <a:r>
+              <a:rPr lang="en-US" sz="2800" b="1" dirty="0" err="1">
+                <a:solidFill>
+                  <a:schemeClr val="tx1"/>
+                </a:solidFill>
+                <a:latin typeface="Times New Roman" panose="02020603050405020304" pitchFamily="18" charset="0"/>
+                <a:cs typeface="Times New Roman" panose="02020603050405020304" pitchFamily="18" charset="0"/>
+              </a:rPr>
+              <a:t>hệ</a:t>
+            </a:r>
+            <a:r>
+              <a:rPr lang="en-US" sz="2800" b="1" dirty="0">
+                <a:solidFill>
+                  <a:schemeClr val="tx1"/>
+                </a:solidFill>
+                <a:latin typeface="Times New Roman" panose="02020603050405020304" pitchFamily="18" charset="0"/>
+                <a:cs typeface="Times New Roman" panose="02020603050405020304" pitchFamily="18" charset="0"/>
+              </a:rPr>
+              <a:t> </a:t>
+            </a:r>
+            <a:r>
+              <a:rPr lang="en-US" sz="2800" b="1" dirty="0" err="1">
+                <a:solidFill>
+                  <a:schemeClr val="tx1"/>
+                </a:solidFill>
+                <a:latin typeface="Times New Roman" panose="02020603050405020304" pitchFamily="18" charset="0"/>
+                <a:cs typeface="Times New Roman" panose="02020603050405020304" pitchFamily="18" charset="0"/>
+              </a:rPr>
+              <a:t>thống</a:t>
+            </a:r>
+            <a:r>
+              <a:rPr lang="en-US" sz="2800" b="1" dirty="0">
+                <a:solidFill>
+                  <a:schemeClr val="tx1"/>
+                </a:solidFill>
+                <a:latin typeface="Times New Roman" panose="02020603050405020304" pitchFamily="18" charset="0"/>
+                <a:cs typeface="Times New Roman" panose="02020603050405020304" pitchFamily="18" charset="0"/>
+              </a:rPr>
+              <a:t>:</a:t>
+            </a:r>
+          </a:p>
+          <a:p>
+            <a:pPr marL="457200" indent="-457200">
+              <a:buFont typeface="Wingdings" panose="05000000000000000000" pitchFamily="2" charset="2"/>
+              <a:buChar char="Ø"/>
+            </a:pPr>
+            <a:r>
+              <a:rPr lang="en-US" sz="2800" dirty="0" err="1">
+                <a:solidFill>
+                  <a:schemeClr val="tx1"/>
+                </a:solidFill>
+                <a:latin typeface="Times New Roman" panose="02020603050405020304" pitchFamily="18" charset="0"/>
+                <a:cs typeface="Times New Roman" panose="02020603050405020304" pitchFamily="18" charset="0"/>
+              </a:rPr>
+              <a:t>Chương</a:t>
+            </a:r>
+            <a:r>
+              <a:rPr lang="en-US" sz="2800" dirty="0">
+                <a:solidFill>
+                  <a:schemeClr val="tx1"/>
+                </a:solidFill>
+                <a:latin typeface="Times New Roman" panose="02020603050405020304" pitchFamily="18" charset="0"/>
+                <a:cs typeface="Times New Roman" panose="02020603050405020304" pitchFamily="18" charset="0"/>
+              </a:rPr>
+              <a:t> </a:t>
+            </a:r>
+            <a:r>
+              <a:rPr lang="en-US" sz="2800" dirty="0" err="1">
+                <a:solidFill>
+                  <a:schemeClr val="tx1"/>
+                </a:solidFill>
+                <a:latin typeface="Times New Roman" panose="02020603050405020304" pitchFamily="18" charset="0"/>
+                <a:cs typeface="Times New Roman" panose="02020603050405020304" pitchFamily="18" charset="0"/>
+              </a:rPr>
+              <a:t>trình</a:t>
+            </a:r>
+            <a:r>
+              <a:rPr lang="en-US" sz="2800" dirty="0">
+                <a:solidFill>
+                  <a:schemeClr val="tx1"/>
+                </a:solidFill>
+                <a:latin typeface="Times New Roman" panose="02020603050405020304" pitchFamily="18" charset="0"/>
+                <a:cs typeface="Times New Roman" panose="02020603050405020304" pitchFamily="18" charset="0"/>
+              </a:rPr>
+              <a:t> </a:t>
+            </a:r>
+            <a:r>
+              <a:rPr lang="en-US" sz="2800" dirty="0" err="1">
+                <a:solidFill>
+                  <a:schemeClr val="tx1"/>
+                </a:solidFill>
+                <a:latin typeface="Times New Roman" panose="02020603050405020304" pitchFamily="18" charset="0"/>
+                <a:cs typeface="Times New Roman" panose="02020603050405020304" pitchFamily="18" charset="0"/>
+              </a:rPr>
+              <a:t>chưa</a:t>
+            </a:r>
+            <a:r>
+              <a:rPr lang="en-US" sz="2800" dirty="0">
+                <a:solidFill>
+                  <a:schemeClr val="tx1"/>
+                </a:solidFill>
+                <a:latin typeface="Times New Roman" panose="02020603050405020304" pitchFamily="18" charset="0"/>
+                <a:cs typeface="Times New Roman" panose="02020603050405020304" pitchFamily="18" charset="0"/>
+              </a:rPr>
+              <a:t> </a:t>
+            </a:r>
+            <a:r>
+              <a:rPr lang="en-US" sz="2800" dirty="0" err="1">
+                <a:solidFill>
+                  <a:schemeClr val="tx1"/>
+                </a:solidFill>
+                <a:latin typeface="Times New Roman" panose="02020603050405020304" pitchFamily="18" charset="0"/>
+                <a:cs typeface="Times New Roman" panose="02020603050405020304" pitchFamily="18" charset="0"/>
+              </a:rPr>
+              <a:t>được</a:t>
+            </a:r>
+            <a:r>
+              <a:rPr lang="en-US" sz="2800" dirty="0">
+                <a:solidFill>
+                  <a:schemeClr val="tx1"/>
+                </a:solidFill>
+                <a:latin typeface="Times New Roman" panose="02020603050405020304" pitchFamily="18" charset="0"/>
+                <a:cs typeface="Times New Roman" panose="02020603050405020304" pitchFamily="18" charset="0"/>
+              </a:rPr>
+              <a:t> </a:t>
+            </a:r>
+            <a:r>
+              <a:rPr lang="en-US" sz="2800" dirty="0" err="1">
+                <a:solidFill>
+                  <a:schemeClr val="tx1"/>
+                </a:solidFill>
+                <a:latin typeface="Times New Roman" panose="02020603050405020304" pitchFamily="18" charset="0"/>
+                <a:cs typeface="Times New Roman" panose="02020603050405020304" pitchFamily="18" charset="0"/>
+              </a:rPr>
+              <a:t>kiểm</a:t>
+            </a:r>
+            <a:r>
+              <a:rPr lang="en-US" sz="2800" dirty="0">
+                <a:solidFill>
+                  <a:schemeClr val="tx1"/>
+                </a:solidFill>
+                <a:latin typeface="Times New Roman" panose="02020603050405020304" pitchFamily="18" charset="0"/>
+                <a:cs typeface="Times New Roman" panose="02020603050405020304" pitchFamily="18" charset="0"/>
+              </a:rPr>
+              <a:t> </a:t>
+            </a:r>
+            <a:r>
+              <a:rPr lang="en-US" sz="2800" dirty="0" err="1">
+                <a:solidFill>
+                  <a:schemeClr val="tx1"/>
+                </a:solidFill>
+                <a:latin typeface="Times New Roman" panose="02020603050405020304" pitchFamily="18" charset="0"/>
+                <a:cs typeface="Times New Roman" panose="02020603050405020304" pitchFamily="18" charset="0"/>
+              </a:rPr>
+              <a:t>thử</a:t>
+            </a:r>
+            <a:r>
+              <a:rPr lang="en-US" sz="2800" dirty="0">
+                <a:solidFill>
+                  <a:schemeClr val="tx1"/>
+                </a:solidFill>
+                <a:latin typeface="Times New Roman" panose="02020603050405020304" pitchFamily="18" charset="0"/>
+                <a:cs typeface="Times New Roman" panose="02020603050405020304" pitchFamily="18" charset="0"/>
+              </a:rPr>
+              <a:t> chi </a:t>
+            </a:r>
+            <a:r>
+              <a:rPr lang="en-US" sz="2800" dirty="0" err="1">
+                <a:solidFill>
+                  <a:schemeClr val="tx1"/>
+                </a:solidFill>
+                <a:latin typeface="Times New Roman" panose="02020603050405020304" pitchFamily="18" charset="0"/>
+                <a:cs typeface="Times New Roman" panose="02020603050405020304" pitchFamily="18" charset="0"/>
+              </a:rPr>
+              <a:t>tiết</a:t>
+            </a:r>
+            <a:r>
+              <a:rPr lang="en-US" sz="2800" dirty="0">
+                <a:solidFill>
+                  <a:schemeClr val="tx1"/>
+                </a:solidFill>
+                <a:latin typeface="Times New Roman" panose="02020603050405020304" pitchFamily="18" charset="0"/>
+                <a:cs typeface="Times New Roman" panose="02020603050405020304" pitchFamily="18" charset="0"/>
+              </a:rPr>
+              <a:t>, </a:t>
+            </a:r>
+            <a:r>
+              <a:rPr lang="en-US" sz="2800" dirty="0" err="1">
+                <a:solidFill>
+                  <a:schemeClr val="tx1"/>
+                </a:solidFill>
+                <a:latin typeface="Times New Roman" panose="02020603050405020304" pitchFamily="18" charset="0"/>
+                <a:cs typeface="Times New Roman" panose="02020603050405020304" pitchFamily="18" charset="0"/>
+              </a:rPr>
+              <a:t>vẫn</a:t>
+            </a:r>
+            <a:r>
+              <a:rPr lang="en-US" sz="2800" dirty="0">
+                <a:solidFill>
+                  <a:schemeClr val="tx1"/>
+                </a:solidFill>
+                <a:latin typeface="Times New Roman" panose="02020603050405020304" pitchFamily="18" charset="0"/>
+                <a:cs typeface="Times New Roman" panose="02020603050405020304" pitchFamily="18" charset="0"/>
+              </a:rPr>
+              <a:t> </a:t>
+            </a:r>
+            <a:r>
+              <a:rPr lang="en-US" sz="2800" dirty="0" err="1">
+                <a:solidFill>
+                  <a:schemeClr val="tx1"/>
+                </a:solidFill>
+                <a:latin typeface="Times New Roman" panose="02020603050405020304" pitchFamily="18" charset="0"/>
+                <a:cs typeface="Times New Roman" panose="02020603050405020304" pitchFamily="18" charset="0"/>
+              </a:rPr>
+              <a:t>còn</a:t>
+            </a:r>
+            <a:r>
+              <a:rPr lang="en-US" sz="2800" dirty="0">
+                <a:solidFill>
+                  <a:schemeClr val="tx1"/>
+                </a:solidFill>
+                <a:latin typeface="Times New Roman" panose="02020603050405020304" pitchFamily="18" charset="0"/>
+                <a:cs typeface="Times New Roman" panose="02020603050405020304" pitchFamily="18" charset="0"/>
+              </a:rPr>
+              <a:t> </a:t>
+            </a:r>
+            <a:r>
+              <a:rPr lang="en-US" sz="2800" dirty="0" err="1">
+                <a:solidFill>
+                  <a:schemeClr val="tx1"/>
+                </a:solidFill>
+                <a:latin typeface="Times New Roman" panose="02020603050405020304" pitchFamily="18" charset="0"/>
+                <a:cs typeface="Times New Roman" panose="02020603050405020304" pitchFamily="18" charset="0"/>
+              </a:rPr>
+              <a:t>lỗi</a:t>
+            </a:r>
+            <a:r>
+              <a:rPr lang="en-US" sz="2800" dirty="0">
+                <a:solidFill>
+                  <a:schemeClr val="tx1"/>
+                </a:solidFill>
+                <a:latin typeface="Times New Roman" panose="02020603050405020304" pitchFamily="18" charset="0"/>
+                <a:cs typeface="Times New Roman" panose="02020603050405020304" pitchFamily="18" charset="0"/>
+              </a:rPr>
+              <a:t> </a:t>
+            </a:r>
+            <a:r>
+              <a:rPr lang="en-US" sz="2800" dirty="0" err="1">
+                <a:solidFill>
+                  <a:schemeClr val="tx1"/>
+                </a:solidFill>
+                <a:latin typeface="Times New Roman" panose="02020603050405020304" pitchFamily="18" charset="0"/>
+                <a:cs typeface="Times New Roman" panose="02020603050405020304" pitchFamily="18" charset="0"/>
+              </a:rPr>
+              <a:t>trong</a:t>
+            </a:r>
+            <a:r>
+              <a:rPr lang="en-US" sz="2800" dirty="0">
+                <a:solidFill>
+                  <a:schemeClr val="tx1"/>
+                </a:solidFill>
+                <a:latin typeface="Times New Roman" panose="02020603050405020304" pitchFamily="18" charset="0"/>
+                <a:cs typeface="Times New Roman" panose="02020603050405020304" pitchFamily="18" charset="0"/>
+              </a:rPr>
+              <a:t> </a:t>
+            </a:r>
+            <a:r>
+              <a:rPr lang="en-US" sz="2800" dirty="0" err="1">
+                <a:solidFill>
+                  <a:schemeClr val="tx1"/>
+                </a:solidFill>
+                <a:latin typeface="Times New Roman" panose="02020603050405020304" pitchFamily="18" charset="0"/>
+                <a:cs typeface="Times New Roman" panose="02020603050405020304" pitchFamily="18" charset="0"/>
+              </a:rPr>
+              <a:t>quá</a:t>
+            </a:r>
+            <a:r>
+              <a:rPr lang="en-US" sz="2800" dirty="0">
+                <a:solidFill>
+                  <a:schemeClr val="tx1"/>
+                </a:solidFill>
+                <a:latin typeface="Times New Roman" panose="02020603050405020304" pitchFamily="18" charset="0"/>
+                <a:cs typeface="Times New Roman" panose="02020603050405020304" pitchFamily="18" charset="0"/>
+              </a:rPr>
+              <a:t> </a:t>
+            </a:r>
+            <a:r>
+              <a:rPr lang="en-US" sz="2800" dirty="0" err="1">
+                <a:solidFill>
+                  <a:schemeClr val="tx1"/>
+                </a:solidFill>
+                <a:latin typeface="Times New Roman" panose="02020603050405020304" pitchFamily="18" charset="0"/>
+                <a:cs typeface="Times New Roman" panose="02020603050405020304" pitchFamily="18" charset="0"/>
+              </a:rPr>
+              <a:t>trình</a:t>
+            </a:r>
+            <a:r>
+              <a:rPr lang="en-US" sz="2800" dirty="0">
+                <a:solidFill>
+                  <a:schemeClr val="tx1"/>
+                </a:solidFill>
+                <a:latin typeface="Times New Roman" panose="02020603050405020304" pitchFamily="18" charset="0"/>
+                <a:cs typeface="Times New Roman" panose="02020603050405020304" pitchFamily="18" charset="0"/>
+              </a:rPr>
+              <a:t> </a:t>
+            </a:r>
+            <a:r>
+              <a:rPr lang="en-US" sz="2800" dirty="0" err="1">
+                <a:solidFill>
+                  <a:schemeClr val="tx1"/>
+                </a:solidFill>
+                <a:latin typeface="Times New Roman" panose="02020603050405020304" pitchFamily="18" charset="0"/>
+                <a:cs typeface="Times New Roman" panose="02020603050405020304" pitchFamily="18" charset="0"/>
+              </a:rPr>
+              <a:t>chạy</a:t>
+            </a:r>
+            <a:r>
+              <a:rPr lang="en-US" sz="2800" dirty="0">
+                <a:solidFill>
+                  <a:schemeClr val="tx1"/>
+                </a:solidFill>
+                <a:latin typeface="Times New Roman" panose="02020603050405020304" pitchFamily="18" charset="0"/>
+                <a:cs typeface="Times New Roman" panose="02020603050405020304" pitchFamily="18" charset="0"/>
+              </a:rPr>
+              <a:t>. </a:t>
+            </a:r>
+          </a:p>
+          <a:p>
+            <a:pPr marL="457200" indent="-457200">
+              <a:buFont typeface="Wingdings" panose="05000000000000000000" pitchFamily="2" charset="2"/>
+              <a:buChar char="Ø"/>
+            </a:pPr>
+            <a:r>
+              <a:rPr lang="en-US" sz="2800" dirty="0" err="1">
+                <a:solidFill>
+                  <a:schemeClr val="tx1"/>
+                </a:solidFill>
+                <a:latin typeface="Times New Roman" panose="02020603050405020304" pitchFamily="18" charset="0"/>
+                <a:cs typeface="Times New Roman" panose="02020603050405020304" pitchFamily="18" charset="0"/>
+              </a:rPr>
+              <a:t>Một</a:t>
+            </a:r>
+            <a:r>
+              <a:rPr lang="en-US" sz="2800" dirty="0">
+                <a:solidFill>
+                  <a:schemeClr val="tx1"/>
+                </a:solidFill>
+                <a:latin typeface="Times New Roman" panose="02020603050405020304" pitchFamily="18" charset="0"/>
+                <a:cs typeface="Times New Roman" panose="02020603050405020304" pitchFamily="18" charset="0"/>
+              </a:rPr>
+              <a:t> </a:t>
+            </a:r>
+            <a:r>
+              <a:rPr lang="en-US" sz="2800" dirty="0" err="1">
+                <a:solidFill>
+                  <a:schemeClr val="tx1"/>
+                </a:solidFill>
+                <a:latin typeface="Times New Roman" panose="02020603050405020304" pitchFamily="18" charset="0"/>
+                <a:cs typeface="Times New Roman" panose="02020603050405020304" pitchFamily="18" charset="0"/>
+              </a:rPr>
+              <a:t>số</a:t>
+            </a:r>
+            <a:r>
+              <a:rPr lang="en-US" sz="2800" dirty="0">
+                <a:solidFill>
+                  <a:schemeClr val="tx1"/>
+                </a:solidFill>
+                <a:latin typeface="Times New Roman" panose="02020603050405020304" pitchFamily="18" charset="0"/>
+                <a:cs typeface="Times New Roman" panose="02020603050405020304" pitchFamily="18" charset="0"/>
+              </a:rPr>
+              <a:t> </a:t>
+            </a:r>
+            <a:r>
+              <a:rPr lang="en-US" sz="2800" dirty="0" err="1">
+                <a:solidFill>
+                  <a:schemeClr val="tx1"/>
+                </a:solidFill>
+                <a:latin typeface="Times New Roman" panose="02020603050405020304" pitchFamily="18" charset="0"/>
+                <a:cs typeface="Times New Roman" panose="02020603050405020304" pitchFamily="18" charset="0"/>
+              </a:rPr>
+              <a:t>chức</a:t>
+            </a:r>
+            <a:r>
+              <a:rPr lang="en-US" sz="2800" dirty="0">
+                <a:solidFill>
+                  <a:schemeClr val="tx1"/>
+                </a:solidFill>
+                <a:latin typeface="Times New Roman" panose="02020603050405020304" pitchFamily="18" charset="0"/>
+                <a:cs typeface="Times New Roman" panose="02020603050405020304" pitchFamily="18" charset="0"/>
+              </a:rPr>
+              <a:t> </a:t>
+            </a:r>
+            <a:r>
+              <a:rPr lang="en-US" sz="2800" dirty="0" err="1">
+                <a:solidFill>
+                  <a:schemeClr val="tx1"/>
+                </a:solidFill>
+                <a:latin typeface="Times New Roman" panose="02020603050405020304" pitchFamily="18" charset="0"/>
+                <a:cs typeface="Times New Roman" panose="02020603050405020304" pitchFamily="18" charset="0"/>
+              </a:rPr>
+              <a:t>năng</a:t>
+            </a:r>
+            <a:r>
+              <a:rPr lang="en-US" sz="2800" dirty="0">
+                <a:solidFill>
+                  <a:schemeClr val="tx1"/>
+                </a:solidFill>
+                <a:latin typeface="Times New Roman" panose="02020603050405020304" pitchFamily="18" charset="0"/>
+                <a:cs typeface="Times New Roman" panose="02020603050405020304" pitchFamily="18" charset="0"/>
+              </a:rPr>
+              <a:t> </a:t>
+            </a:r>
+            <a:r>
+              <a:rPr lang="en-US" sz="2800" dirty="0" err="1">
+                <a:solidFill>
+                  <a:schemeClr val="tx1"/>
+                </a:solidFill>
+                <a:latin typeface="Times New Roman" panose="02020603050405020304" pitchFamily="18" charset="0"/>
+                <a:cs typeface="Times New Roman" panose="02020603050405020304" pitchFamily="18" charset="0"/>
+              </a:rPr>
+              <a:t>chưa</a:t>
+            </a:r>
+            <a:r>
+              <a:rPr lang="en-US" sz="2800" dirty="0">
+                <a:solidFill>
+                  <a:schemeClr val="tx1"/>
+                </a:solidFill>
+                <a:latin typeface="Times New Roman" panose="02020603050405020304" pitchFamily="18" charset="0"/>
+                <a:cs typeface="Times New Roman" panose="02020603050405020304" pitchFamily="18" charset="0"/>
+              </a:rPr>
+              <a:t> </a:t>
+            </a:r>
+            <a:r>
+              <a:rPr lang="en-US" sz="2800" dirty="0" err="1">
+                <a:solidFill>
+                  <a:schemeClr val="tx1"/>
+                </a:solidFill>
+                <a:latin typeface="Times New Roman" panose="02020603050405020304" pitchFamily="18" charset="0"/>
+                <a:cs typeface="Times New Roman" panose="02020603050405020304" pitchFamily="18" charset="0"/>
+              </a:rPr>
+              <a:t>được</a:t>
+            </a:r>
+            <a:r>
+              <a:rPr lang="en-US" sz="2800" dirty="0">
+                <a:solidFill>
+                  <a:schemeClr val="tx1"/>
+                </a:solidFill>
+                <a:latin typeface="Times New Roman" panose="02020603050405020304" pitchFamily="18" charset="0"/>
+                <a:cs typeface="Times New Roman" panose="02020603050405020304" pitchFamily="18" charset="0"/>
+              </a:rPr>
+              <a:t> </a:t>
+            </a:r>
+            <a:r>
+              <a:rPr lang="en-US" sz="2800" dirty="0" err="1">
+                <a:solidFill>
+                  <a:schemeClr val="tx1"/>
+                </a:solidFill>
+                <a:latin typeface="Times New Roman" panose="02020603050405020304" pitchFamily="18" charset="0"/>
+                <a:cs typeface="Times New Roman" panose="02020603050405020304" pitchFamily="18" charset="0"/>
+              </a:rPr>
+              <a:t>hoàn</a:t>
+            </a:r>
+            <a:r>
+              <a:rPr lang="en-US" sz="2800" dirty="0">
+                <a:solidFill>
+                  <a:schemeClr val="tx1"/>
+                </a:solidFill>
+                <a:latin typeface="Times New Roman" panose="02020603050405020304" pitchFamily="18" charset="0"/>
+                <a:cs typeface="Times New Roman" panose="02020603050405020304" pitchFamily="18" charset="0"/>
+              </a:rPr>
+              <a:t> </a:t>
+            </a:r>
+            <a:r>
+              <a:rPr lang="en-US" sz="2800" dirty="0" err="1">
+                <a:solidFill>
+                  <a:schemeClr val="tx1"/>
+                </a:solidFill>
+                <a:latin typeface="Times New Roman" panose="02020603050405020304" pitchFamily="18" charset="0"/>
+                <a:cs typeface="Times New Roman" panose="02020603050405020304" pitchFamily="18" charset="0"/>
+              </a:rPr>
+              <a:t>thành</a:t>
+            </a:r>
+            <a:r>
+              <a:rPr lang="en-US" sz="2800" dirty="0">
+                <a:solidFill>
+                  <a:schemeClr val="tx1"/>
+                </a:solidFill>
+                <a:latin typeface="Times New Roman" panose="02020603050405020304" pitchFamily="18" charset="0"/>
+                <a:cs typeface="Times New Roman" panose="02020603050405020304" pitchFamily="18" charset="0"/>
+              </a:rPr>
+              <a:t> </a:t>
+            </a:r>
+            <a:r>
+              <a:rPr lang="en-US" sz="2800" dirty="0" err="1">
+                <a:solidFill>
+                  <a:schemeClr val="tx1"/>
+                </a:solidFill>
+                <a:latin typeface="Times New Roman" panose="02020603050405020304" pitchFamily="18" charset="0"/>
+                <a:cs typeface="Times New Roman" panose="02020603050405020304" pitchFamily="18" charset="0"/>
+              </a:rPr>
+              <a:t>như</a:t>
+            </a:r>
+            <a:r>
+              <a:rPr lang="en-US" sz="2800" dirty="0">
+                <a:solidFill>
+                  <a:schemeClr val="tx1"/>
+                </a:solidFill>
+                <a:latin typeface="Times New Roman" panose="02020603050405020304" pitchFamily="18" charset="0"/>
+                <a:cs typeface="Times New Roman" panose="02020603050405020304" pitchFamily="18" charset="0"/>
+              </a:rPr>
+              <a:t>: </a:t>
+            </a:r>
+            <a:r>
+              <a:rPr lang="en-US" sz="2800" dirty="0" err="1">
+                <a:solidFill>
+                  <a:schemeClr val="tx1"/>
+                </a:solidFill>
+                <a:latin typeface="Times New Roman" panose="02020603050405020304" pitchFamily="18" charset="0"/>
+                <a:cs typeface="Times New Roman" panose="02020603050405020304" pitchFamily="18" charset="0"/>
+              </a:rPr>
+              <a:t>nhập</a:t>
+            </a:r>
+            <a:r>
+              <a:rPr lang="en-US" sz="2800" dirty="0">
+                <a:solidFill>
+                  <a:schemeClr val="tx1"/>
+                </a:solidFill>
+                <a:latin typeface="Times New Roman" panose="02020603050405020304" pitchFamily="18" charset="0"/>
+                <a:cs typeface="Times New Roman" panose="02020603050405020304" pitchFamily="18" charset="0"/>
+              </a:rPr>
+              <a:t> </a:t>
+            </a:r>
+            <a:r>
+              <a:rPr lang="en-US" sz="2800" dirty="0" err="1">
+                <a:solidFill>
+                  <a:schemeClr val="tx1"/>
+                </a:solidFill>
+                <a:latin typeface="Times New Roman" panose="02020603050405020304" pitchFamily="18" charset="0"/>
+                <a:cs typeface="Times New Roman" panose="02020603050405020304" pitchFamily="18" charset="0"/>
+              </a:rPr>
+              <a:t>xuất</a:t>
+            </a:r>
+            <a:r>
+              <a:rPr lang="en-US" sz="2800" dirty="0">
+                <a:solidFill>
+                  <a:schemeClr val="tx1"/>
+                </a:solidFill>
+                <a:latin typeface="Times New Roman" panose="02020603050405020304" pitchFamily="18" charset="0"/>
+                <a:cs typeface="Times New Roman" panose="02020603050405020304" pitchFamily="18" charset="0"/>
+              </a:rPr>
+              <a:t> </a:t>
+            </a:r>
+            <a:r>
+              <a:rPr lang="en-US" sz="2800" dirty="0" err="1">
+                <a:solidFill>
+                  <a:schemeClr val="tx1"/>
+                </a:solidFill>
+                <a:latin typeface="Times New Roman" panose="02020603050405020304" pitchFamily="18" charset="0"/>
+                <a:cs typeface="Times New Roman" panose="02020603050405020304" pitchFamily="18" charset="0"/>
+              </a:rPr>
+              <a:t>dữ</a:t>
+            </a:r>
+            <a:r>
+              <a:rPr lang="en-US" sz="2800" dirty="0">
+                <a:solidFill>
+                  <a:schemeClr val="tx1"/>
+                </a:solidFill>
+                <a:latin typeface="Times New Roman" panose="02020603050405020304" pitchFamily="18" charset="0"/>
+                <a:cs typeface="Times New Roman" panose="02020603050405020304" pitchFamily="18" charset="0"/>
+              </a:rPr>
+              <a:t> </a:t>
+            </a:r>
+            <a:r>
+              <a:rPr lang="en-US" sz="2800" dirty="0" err="1">
+                <a:solidFill>
+                  <a:schemeClr val="tx1"/>
+                </a:solidFill>
+                <a:latin typeface="Times New Roman" panose="02020603050405020304" pitchFamily="18" charset="0"/>
+                <a:cs typeface="Times New Roman" panose="02020603050405020304" pitchFamily="18" charset="0"/>
+              </a:rPr>
+              <a:t>liệu</a:t>
+            </a:r>
+            <a:r>
+              <a:rPr lang="en-US" sz="2800" dirty="0">
+                <a:solidFill>
+                  <a:schemeClr val="tx1"/>
+                </a:solidFill>
+                <a:latin typeface="Times New Roman" panose="02020603050405020304" pitchFamily="18" charset="0"/>
+                <a:cs typeface="Times New Roman" panose="02020603050405020304" pitchFamily="18" charset="0"/>
+              </a:rPr>
+              <a:t> </a:t>
+            </a:r>
+            <a:r>
+              <a:rPr lang="en-US" sz="2800" dirty="0" err="1">
+                <a:solidFill>
+                  <a:schemeClr val="tx1"/>
+                </a:solidFill>
+                <a:latin typeface="Times New Roman" panose="02020603050405020304" pitchFamily="18" charset="0"/>
+                <a:cs typeface="Times New Roman" panose="02020603050405020304" pitchFamily="18" charset="0"/>
+              </a:rPr>
+              <a:t>từ</a:t>
+            </a:r>
+            <a:r>
+              <a:rPr lang="en-US" sz="2800" dirty="0">
+                <a:solidFill>
+                  <a:schemeClr val="tx1"/>
+                </a:solidFill>
+                <a:latin typeface="Times New Roman" panose="02020603050405020304" pitchFamily="18" charset="0"/>
+                <a:cs typeface="Times New Roman" panose="02020603050405020304" pitchFamily="18" charset="0"/>
+              </a:rPr>
+              <a:t> excel, </a:t>
+            </a:r>
+            <a:r>
+              <a:rPr lang="en-US" sz="2800" dirty="0" err="1">
+                <a:solidFill>
+                  <a:schemeClr val="tx1"/>
+                </a:solidFill>
+                <a:latin typeface="Times New Roman" panose="02020603050405020304" pitchFamily="18" charset="0"/>
+                <a:cs typeface="Times New Roman" panose="02020603050405020304" pitchFamily="18" charset="0"/>
+              </a:rPr>
+              <a:t>chức</a:t>
+            </a:r>
+            <a:r>
+              <a:rPr lang="en-US" sz="2800" dirty="0">
+                <a:solidFill>
+                  <a:schemeClr val="tx1"/>
+                </a:solidFill>
+                <a:latin typeface="Times New Roman" panose="02020603050405020304" pitchFamily="18" charset="0"/>
+                <a:cs typeface="Times New Roman" panose="02020603050405020304" pitchFamily="18" charset="0"/>
+              </a:rPr>
+              <a:t> </a:t>
+            </a:r>
+            <a:r>
+              <a:rPr lang="en-US" sz="2800" dirty="0" err="1">
+                <a:solidFill>
+                  <a:schemeClr val="tx1"/>
+                </a:solidFill>
+                <a:latin typeface="Times New Roman" panose="02020603050405020304" pitchFamily="18" charset="0"/>
+                <a:cs typeface="Times New Roman" panose="02020603050405020304" pitchFamily="18" charset="0"/>
+              </a:rPr>
+              <a:t>năng</a:t>
+            </a:r>
+            <a:r>
+              <a:rPr lang="en-US" sz="2800" dirty="0">
+                <a:solidFill>
+                  <a:schemeClr val="tx1"/>
+                </a:solidFill>
+                <a:latin typeface="Times New Roman" panose="02020603050405020304" pitchFamily="18" charset="0"/>
+                <a:cs typeface="Times New Roman" panose="02020603050405020304" pitchFamily="18" charset="0"/>
+              </a:rPr>
+              <a:t> in ở </a:t>
+            </a:r>
+            <a:r>
+              <a:rPr lang="en-US" sz="2800" dirty="0" err="1">
+                <a:solidFill>
+                  <a:schemeClr val="tx1"/>
+                </a:solidFill>
+                <a:latin typeface="Times New Roman" panose="02020603050405020304" pitchFamily="18" charset="0"/>
+                <a:cs typeface="Times New Roman" panose="02020603050405020304" pitchFamily="18" charset="0"/>
+              </a:rPr>
+              <a:t>một</a:t>
+            </a:r>
+            <a:r>
+              <a:rPr lang="en-US" sz="2800" dirty="0">
+                <a:solidFill>
+                  <a:schemeClr val="tx1"/>
+                </a:solidFill>
+                <a:latin typeface="Times New Roman" panose="02020603050405020304" pitchFamily="18" charset="0"/>
+                <a:cs typeface="Times New Roman" panose="02020603050405020304" pitchFamily="18" charset="0"/>
+              </a:rPr>
+              <a:t> </a:t>
+            </a:r>
+            <a:r>
+              <a:rPr lang="en-US" sz="2800" dirty="0" err="1">
+                <a:solidFill>
+                  <a:schemeClr val="tx1"/>
+                </a:solidFill>
+                <a:latin typeface="Times New Roman" panose="02020603050405020304" pitchFamily="18" charset="0"/>
+                <a:cs typeface="Times New Roman" panose="02020603050405020304" pitchFamily="18" charset="0"/>
+              </a:rPr>
+              <a:t>số</a:t>
+            </a:r>
+            <a:r>
+              <a:rPr lang="en-US" sz="2800" dirty="0">
+                <a:solidFill>
+                  <a:schemeClr val="tx1"/>
+                </a:solidFill>
+                <a:latin typeface="Times New Roman" panose="02020603050405020304" pitchFamily="18" charset="0"/>
+                <a:cs typeface="Times New Roman" panose="02020603050405020304" pitchFamily="18" charset="0"/>
+              </a:rPr>
+              <a:t> </a:t>
+            </a:r>
+            <a:r>
+              <a:rPr lang="en-US" sz="2800" dirty="0" err="1">
+                <a:solidFill>
+                  <a:schemeClr val="tx1"/>
+                </a:solidFill>
+                <a:latin typeface="Times New Roman" panose="02020603050405020304" pitchFamily="18" charset="0"/>
+                <a:cs typeface="Times New Roman" panose="02020603050405020304" pitchFamily="18" charset="0"/>
+              </a:rPr>
+              <a:t>màn</a:t>
+            </a:r>
+            <a:r>
+              <a:rPr lang="en-US" sz="2800" dirty="0">
+                <a:solidFill>
+                  <a:schemeClr val="tx1"/>
+                </a:solidFill>
+                <a:latin typeface="Times New Roman" panose="02020603050405020304" pitchFamily="18" charset="0"/>
+                <a:cs typeface="Times New Roman" panose="02020603050405020304" pitchFamily="18" charset="0"/>
+              </a:rPr>
+              <a:t> </a:t>
+            </a:r>
+            <a:r>
+              <a:rPr lang="en-US" sz="2800" dirty="0" err="1">
+                <a:solidFill>
+                  <a:schemeClr val="tx1"/>
+                </a:solidFill>
+                <a:latin typeface="Times New Roman" panose="02020603050405020304" pitchFamily="18" charset="0"/>
+                <a:cs typeface="Times New Roman" panose="02020603050405020304" pitchFamily="18" charset="0"/>
+              </a:rPr>
+              <a:t>hình</a:t>
+            </a:r>
+            <a:r>
+              <a:rPr lang="en-US" sz="2800" dirty="0">
+                <a:solidFill>
+                  <a:schemeClr val="tx1"/>
+                </a:solidFill>
+                <a:latin typeface="Times New Roman" panose="02020603050405020304" pitchFamily="18" charset="0"/>
+                <a:cs typeface="Times New Roman" panose="02020603050405020304" pitchFamily="18" charset="0"/>
+              </a:rPr>
+              <a:t>, </a:t>
+            </a:r>
+            <a:r>
+              <a:rPr lang="en-US" sz="2800" dirty="0" err="1">
+                <a:solidFill>
+                  <a:schemeClr val="tx1"/>
+                </a:solidFill>
+                <a:latin typeface="Times New Roman" panose="02020603050405020304" pitchFamily="18" charset="0"/>
+                <a:cs typeface="Times New Roman" panose="02020603050405020304" pitchFamily="18" charset="0"/>
+              </a:rPr>
+              <a:t>quản</a:t>
+            </a:r>
+            <a:r>
+              <a:rPr lang="en-US" sz="2800" dirty="0">
+                <a:solidFill>
+                  <a:schemeClr val="tx1"/>
+                </a:solidFill>
+                <a:latin typeface="Times New Roman" panose="02020603050405020304" pitchFamily="18" charset="0"/>
+                <a:cs typeface="Times New Roman" panose="02020603050405020304" pitchFamily="18" charset="0"/>
+              </a:rPr>
+              <a:t> </a:t>
+            </a:r>
+            <a:r>
+              <a:rPr lang="en-US" sz="2800" dirty="0" err="1">
+                <a:solidFill>
+                  <a:schemeClr val="tx1"/>
+                </a:solidFill>
+                <a:latin typeface="Times New Roman" panose="02020603050405020304" pitchFamily="18" charset="0"/>
+                <a:cs typeface="Times New Roman" panose="02020603050405020304" pitchFamily="18" charset="0"/>
+              </a:rPr>
+              <a:t>lý</a:t>
+            </a:r>
+            <a:r>
+              <a:rPr lang="en-US" sz="2800" dirty="0">
+                <a:solidFill>
+                  <a:schemeClr val="tx1"/>
+                </a:solidFill>
+                <a:latin typeface="Times New Roman" panose="02020603050405020304" pitchFamily="18" charset="0"/>
+                <a:cs typeface="Times New Roman" panose="02020603050405020304" pitchFamily="18" charset="0"/>
+              </a:rPr>
+              <a:t> </a:t>
+            </a:r>
+            <a:r>
+              <a:rPr lang="en-US" sz="2800" dirty="0" err="1">
+                <a:solidFill>
+                  <a:schemeClr val="tx1"/>
+                </a:solidFill>
+                <a:latin typeface="Times New Roman" panose="02020603050405020304" pitchFamily="18" charset="0"/>
+                <a:cs typeface="Times New Roman" panose="02020603050405020304" pitchFamily="18" charset="0"/>
+              </a:rPr>
+              <a:t>theo</a:t>
+            </a:r>
+            <a:r>
+              <a:rPr lang="en-US" sz="2800" dirty="0">
+                <a:solidFill>
+                  <a:schemeClr val="tx1"/>
+                </a:solidFill>
+                <a:latin typeface="Times New Roman" panose="02020603050405020304" pitchFamily="18" charset="0"/>
+                <a:cs typeface="Times New Roman" panose="02020603050405020304" pitchFamily="18" charset="0"/>
+              </a:rPr>
+              <a:t> chi </a:t>
+            </a:r>
+            <a:r>
+              <a:rPr lang="en-US" sz="2800" dirty="0" err="1">
+                <a:solidFill>
+                  <a:schemeClr val="tx1"/>
+                </a:solidFill>
+                <a:latin typeface="Times New Roman" panose="02020603050405020304" pitchFamily="18" charset="0"/>
+                <a:cs typeface="Times New Roman" panose="02020603050405020304" pitchFamily="18" charset="0"/>
+              </a:rPr>
+              <a:t>nhánh</a:t>
+            </a:r>
+            <a:r>
+              <a:rPr lang="en-US" sz="2800" dirty="0">
+                <a:solidFill>
+                  <a:schemeClr val="tx1"/>
+                </a:solidFill>
+                <a:latin typeface="Times New Roman" panose="02020603050405020304" pitchFamily="18" charset="0"/>
+                <a:cs typeface="Times New Roman" panose="02020603050405020304" pitchFamily="18" charset="0"/>
+              </a:rPr>
+              <a:t>.</a:t>
+            </a:r>
+          </a:p>
+          <a:p>
+            <a:endParaRPr lang="en-US" sz="2800" b="1" dirty="0">
+              <a:solidFill>
+                <a:schemeClr val="tx1"/>
+              </a:solidFill>
+              <a:latin typeface="Times New Roman" panose="02020603050405020304" pitchFamily="18" charset="0"/>
+              <a:cs typeface="Times New Roman" panose="02020603050405020304" pitchFamily="18" charset="0"/>
+            </a:endParaRPr>
+          </a:p>
+        </p:txBody>
+      </p:sp>
+    </p:spTree>
+    <p:extLst>
+      <p:ext uri="{BB962C8B-B14F-4D97-AF65-F5344CB8AC3E}">
+        <p14:creationId xmlns:p14="http://schemas.microsoft.com/office/powerpoint/2010/main" val="1370501929"/>
+      </p:ext>
+    </p:extLst>
+  </p:cSld>
+  <p:clrMapOvr>
+    <a:masterClrMapping/>
+  </p:clrMapOvr>
+</p:sld>
+</file>
+
+<file path=ppt/slides/slide16.xml><?xml version="1.0" encoding="utf-8"?>
+<p:sld xmlns:a="http://schemas.openxmlformats.org/drawingml/2006/main" xmlns:r="http://schemas.openxmlformats.org/officeDocument/2006/relationships" xmlns:p="http://schemas.openxmlformats.org/presentationml/2006/main">
+  <p:cSld>
+    <p:spTree>
+      <p:nvGrpSpPr>
+        <p:cNvPr id="1" name=""/>
+        <p:cNvGrpSpPr/>
+        <p:nvPr/>
+      </p:nvGrpSpPr>
+      <p:grpSpPr>
+        <a:xfrm>
+          <a:off x="0" y="0"/>
+          <a:ext cx="0" cy="0"/>
+          <a:chOff x="0" y="0"/>
+          <a:chExt cx="0" cy="0"/>
+        </a:xfrm>
+      </p:grpSpPr>
+      <p:sp>
+        <p:nvSpPr>
+          <p:cNvPr id="2" name="Title 1">
+            <a:extLst>
+              <a:ext uri="{FF2B5EF4-FFF2-40B4-BE49-F238E27FC236}">
+                <a16:creationId xmlns:a16="http://schemas.microsoft.com/office/drawing/2014/main" id="{16719C43-EC8A-4F91-B2B8-467EE9E0364C}"/>
+              </a:ext>
+            </a:extLst>
+          </p:cNvPr>
+          <p:cNvSpPr>
+            <a:spLocks noGrp="1"/>
+          </p:cNvSpPr>
+          <p:nvPr>
+            <p:ph type="ctrTitle"/>
+          </p:nvPr>
+        </p:nvSpPr>
+        <p:spPr>
+          <a:xfrm>
+            <a:off x="2379764" y="492062"/>
+            <a:ext cx="8791575" cy="924551"/>
+          </a:xfrm>
+        </p:spPr>
+        <p:txBody>
+          <a:bodyPr>
+            <a:normAutofit/>
+          </a:bodyPr>
+          <a:lstStyle/>
+          <a:p>
+            <a:pPr algn="ctr"/>
+            <a:r>
+              <a:rPr lang="en-US" sz="4000" b="1" dirty="0" err="1">
+                <a:latin typeface="Times New Roman" panose="02020603050405020304" pitchFamily="18" charset="0"/>
+                <a:cs typeface="Times New Roman" panose="02020603050405020304" pitchFamily="18" charset="0"/>
+              </a:rPr>
+              <a:t>Kết</a:t>
+            </a:r>
+            <a:r>
+              <a:rPr lang="en-US" sz="4000" b="1" dirty="0">
+                <a:latin typeface="Times New Roman" panose="02020603050405020304" pitchFamily="18" charset="0"/>
+                <a:cs typeface="Times New Roman" panose="02020603050405020304" pitchFamily="18" charset="0"/>
+              </a:rPr>
+              <a:t> </a:t>
+            </a:r>
+            <a:r>
+              <a:rPr lang="en-US" sz="4000" b="1" dirty="0" err="1">
+                <a:latin typeface="Times New Roman" panose="02020603050405020304" pitchFamily="18" charset="0"/>
+                <a:cs typeface="Times New Roman" panose="02020603050405020304" pitchFamily="18" charset="0"/>
+              </a:rPr>
+              <a:t>luận</a:t>
+            </a:r>
+            <a:endParaRPr lang="en-US" sz="4000" b="1" dirty="0">
+              <a:latin typeface="Times New Roman" panose="02020603050405020304" pitchFamily="18" charset="0"/>
+              <a:cs typeface="Times New Roman" panose="02020603050405020304" pitchFamily="18" charset="0"/>
+            </a:endParaRPr>
+          </a:p>
+        </p:txBody>
+      </p:sp>
+      <p:sp>
+        <p:nvSpPr>
+          <p:cNvPr id="3" name="Subtitle 2">
+            <a:extLst>
+              <a:ext uri="{FF2B5EF4-FFF2-40B4-BE49-F238E27FC236}">
+                <a16:creationId xmlns:a16="http://schemas.microsoft.com/office/drawing/2014/main" id="{E0B6DE87-722A-48C1-813D-624EA3268C53}"/>
+              </a:ext>
+            </a:extLst>
+          </p:cNvPr>
+          <p:cNvSpPr>
+            <a:spLocks noGrp="1"/>
+          </p:cNvSpPr>
+          <p:nvPr>
+            <p:ph type="subTitle" idx="1"/>
+          </p:nvPr>
+        </p:nvSpPr>
+        <p:spPr>
+          <a:xfrm>
+            <a:off x="2019300" y="1744910"/>
+            <a:ext cx="9152039" cy="4986090"/>
+          </a:xfrm>
+        </p:spPr>
+        <p:txBody>
+          <a:bodyPr>
+            <a:normAutofit fontScale="85000" lnSpcReduction="20000"/>
+          </a:bodyPr>
+          <a:lstStyle/>
+          <a:p>
+            <a:r>
+              <a:rPr lang="en-US" sz="2800" b="1" dirty="0">
+                <a:solidFill>
+                  <a:schemeClr val="tx1"/>
+                </a:solidFill>
+                <a:latin typeface="Times New Roman" panose="02020603050405020304" pitchFamily="18" charset="0"/>
+                <a:cs typeface="Times New Roman" panose="02020603050405020304" pitchFamily="18" charset="0"/>
+              </a:rPr>
+              <a:t>H</a:t>
+            </a:r>
+            <a:r>
+              <a:rPr lang="vi-VN" sz="2800" b="1" dirty="0">
+                <a:solidFill>
+                  <a:schemeClr val="tx1"/>
+                </a:solidFill>
+                <a:latin typeface="Times New Roman" panose="02020603050405020304" pitchFamily="18" charset="0"/>
+                <a:cs typeface="Times New Roman" panose="02020603050405020304" pitchFamily="18" charset="0"/>
+              </a:rPr>
+              <a:t>ư</a:t>
+            </a:r>
+            <a:r>
+              <a:rPr lang="en-US" sz="2800" b="1" dirty="0" err="1">
+                <a:solidFill>
+                  <a:schemeClr val="tx1"/>
+                </a:solidFill>
+                <a:latin typeface="Times New Roman" panose="02020603050405020304" pitchFamily="18" charset="0"/>
+                <a:cs typeface="Times New Roman" panose="02020603050405020304" pitchFamily="18" charset="0"/>
+              </a:rPr>
+              <a:t>ớng</a:t>
+            </a:r>
+            <a:r>
+              <a:rPr lang="en-US" sz="2800" b="1" dirty="0">
+                <a:solidFill>
+                  <a:schemeClr val="tx1"/>
+                </a:solidFill>
+                <a:latin typeface="Times New Roman" panose="02020603050405020304" pitchFamily="18" charset="0"/>
+                <a:cs typeface="Times New Roman" panose="02020603050405020304" pitchFamily="18" charset="0"/>
+              </a:rPr>
+              <a:t> </a:t>
+            </a:r>
+            <a:r>
+              <a:rPr lang="en-US" sz="2800" b="1" dirty="0" err="1">
+                <a:solidFill>
+                  <a:schemeClr val="tx1"/>
+                </a:solidFill>
+                <a:latin typeface="Times New Roman" panose="02020603050405020304" pitchFamily="18" charset="0"/>
+                <a:cs typeface="Times New Roman" panose="02020603050405020304" pitchFamily="18" charset="0"/>
+              </a:rPr>
+              <a:t>phát</a:t>
+            </a:r>
+            <a:r>
+              <a:rPr lang="en-US" sz="2800" b="1" dirty="0">
+                <a:solidFill>
+                  <a:schemeClr val="tx1"/>
+                </a:solidFill>
+                <a:latin typeface="Times New Roman" panose="02020603050405020304" pitchFamily="18" charset="0"/>
+                <a:cs typeface="Times New Roman" panose="02020603050405020304" pitchFamily="18" charset="0"/>
+              </a:rPr>
+              <a:t> </a:t>
+            </a:r>
+            <a:r>
+              <a:rPr lang="en-US" sz="2800" b="1" dirty="0" err="1">
+                <a:solidFill>
+                  <a:schemeClr val="tx1"/>
+                </a:solidFill>
+                <a:latin typeface="Times New Roman" panose="02020603050405020304" pitchFamily="18" charset="0"/>
+                <a:cs typeface="Times New Roman" panose="02020603050405020304" pitchFamily="18" charset="0"/>
+              </a:rPr>
+              <a:t>triển</a:t>
+            </a:r>
+            <a:r>
+              <a:rPr lang="en-US" sz="2800" b="1" dirty="0">
+                <a:solidFill>
+                  <a:schemeClr val="tx1"/>
+                </a:solidFill>
+                <a:latin typeface="Times New Roman" panose="02020603050405020304" pitchFamily="18" charset="0"/>
+                <a:cs typeface="Times New Roman" panose="02020603050405020304" pitchFamily="18" charset="0"/>
+              </a:rPr>
+              <a:t>:</a:t>
+            </a:r>
+          </a:p>
+          <a:p>
+            <a:pPr marL="285750" lvl="0" indent="-285750">
+              <a:buFont typeface="Wingdings" panose="05000000000000000000" pitchFamily="2" charset="2"/>
+              <a:buChar char="Ø"/>
+            </a:pPr>
+            <a:r>
+              <a:rPr lang="en-US" sz="3000" dirty="0" err="1">
+                <a:solidFill>
+                  <a:schemeClr val="tx1"/>
+                </a:solidFill>
+                <a:latin typeface="Times New Roman" panose="02020603050405020304" pitchFamily="18" charset="0"/>
+                <a:cs typeface="Times New Roman" panose="02020603050405020304" pitchFamily="18" charset="0"/>
+              </a:rPr>
+              <a:t>Tối</a:t>
+            </a:r>
+            <a:r>
+              <a:rPr lang="en-US" sz="3000" dirty="0">
+                <a:solidFill>
+                  <a:schemeClr val="tx1"/>
+                </a:solidFill>
+                <a:latin typeface="Times New Roman" panose="02020603050405020304" pitchFamily="18" charset="0"/>
+                <a:cs typeface="Times New Roman" panose="02020603050405020304" pitchFamily="18" charset="0"/>
+              </a:rPr>
+              <a:t> </a:t>
+            </a:r>
+            <a:r>
+              <a:rPr lang="en-US" sz="3000" dirty="0" err="1">
+                <a:solidFill>
+                  <a:schemeClr val="tx1"/>
+                </a:solidFill>
+                <a:latin typeface="Times New Roman" panose="02020603050405020304" pitchFamily="18" charset="0"/>
+                <a:cs typeface="Times New Roman" panose="02020603050405020304" pitchFamily="18" charset="0"/>
+              </a:rPr>
+              <a:t>ưu</a:t>
+            </a:r>
+            <a:r>
+              <a:rPr lang="en-US" sz="3000" dirty="0">
+                <a:solidFill>
+                  <a:schemeClr val="tx1"/>
+                </a:solidFill>
+                <a:latin typeface="Times New Roman" panose="02020603050405020304" pitchFamily="18" charset="0"/>
+                <a:cs typeface="Times New Roman" panose="02020603050405020304" pitchFamily="18" charset="0"/>
+              </a:rPr>
+              <a:t> </a:t>
+            </a:r>
+            <a:r>
+              <a:rPr lang="en-US" sz="3000" dirty="0" err="1">
+                <a:solidFill>
+                  <a:schemeClr val="tx1"/>
+                </a:solidFill>
+                <a:latin typeface="Times New Roman" panose="02020603050405020304" pitchFamily="18" charset="0"/>
+                <a:cs typeface="Times New Roman" panose="02020603050405020304" pitchFamily="18" charset="0"/>
+              </a:rPr>
+              <a:t>hóa</a:t>
+            </a:r>
+            <a:r>
+              <a:rPr lang="en-US" sz="3000" dirty="0">
+                <a:solidFill>
+                  <a:schemeClr val="tx1"/>
+                </a:solidFill>
+                <a:latin typeface="Times New Roman" panose="02020603050405020304" pitchFamily="18" charset="0"/>
+                <a:cs typeface="Times New Roman" panose="02020603050405020304" pitchFamily="18" charset="0"/>
+              </a:rPr>
+              <a:t> </a:t>
+            </a:r>
+            <a:r>
+              <a:rPr lang="en-US" sz="3000" dirty="0" err="1">
+                <a:solidFill>
+                  <a:schemeClr val="tx1"/>
+                </a:solidFill>
+                <a:latin typeface="Times New Roman" panose="02020603050405020304" pitchFamily="18" charset="0"/>
+                <a:cs typeface="Times New Roman" panose="02020603050405020304" pitchFamily="18" charset="0"/>
+              </a:rPr>
+              <a:t>tốc</a:t>
+            </a:r>
+            <a:r>
+              <a:rPr lang="en-US" sz="3000" dirty="0">
+                <a:solidFill>
+                  <a:schemeClr val="tx1"/>
+                </a:solidFill>
+                <a:latin typeface="Times New Roman" panose="02020603050405020304" pitchFamily="18" charset="0"/>
+                <a:cs typeface="Times New Roman" panose="02020603050405020304" pitchFamily="18" charset="0"/>
+              </a:rPr>
+              <a:t> </a:t>
+            </a:r>
+            <a:r>
+              <a:rPr lang="en-US" sz="3000" dirty="0" err="1">
+                <a:solidFill>
+                  <a:schemeClr val="tx1"/>
+                </a:solidFill>
+                <a:latin typeface="Times New Roman" panose="02020603050405020304" pitchFamily="18" charset="0"/>
+                <a:cs typeface="Times New Roman" panose="02020603050405020304" pitchFamily="18" charset="0"/>
+              </a:rPr>
+              <a:t>độ</a:t>
+            </a:r>
+            <a:r>
+              <a:rPr lang="en-US" sz="3000" dirty="0">
+                <a:solidFill>
+                  <a:schemeClr val="tx1"/>
+                </a:solidFill>
+                <a:latin typeface="Times New Roman" panose="02020603050405020304" pitchFamily="18" charset="0"/>
+                <a:cs typeface="Times New Roman" panose="02020603050405020304" pitchFamily="18" charset="0"/>
+              </a:rPr>
+              <a:t> </a:t>
+            </a:r>
+            <a:r>
+              <a:rPr lang="en-US" sz="3000" dirty="0" err="1">
+                <a:solidFill>
+                  <a:schemeClr val="tx1"/>
+                </a:solidFill>
+                <a:latin typeface="Times New Roman" panose="02020603050405020304" pitchFamily="18" charset="0"/>
+                <a:cs typeface="Times New Roman" panose="02020603050405020304" pitchFamily="18" charset="0"/>
+              </a:rPr>
+              <a:t>tải</a:t>
+            </a:r>
+            <a:r>
+              <a:rPr lang="en-US" sz="3000" dirty="0">
+                <a:solidFill>
+                  <a:schemeClr val="tx1"/>
+                </a:solidFill>
+                <a:latin typeface="Times New Roman" panose="02020603050405020304" pitchFamily="18" charset="0"/>
+                <a:cs typeface="Times New Roman" panose="02020603050405020304" pitchFamily="18" charset="0"/>
+              </a:rPr>
+              <a:t> </a:t>
+            </a:r>
+            <a:r>
+              <a:rPr lang="en-US" sz="3000" dirty="0" err="1">
+                <a:solidFill>
+                  <a:schemeClr val="tx1"/>
+                </a:solidFill>
+                <a:latin typeface="Times New Roman" panose="02020603050405020304" pitchFamily="18" charset="0"/>
+                <a:cs typeface="Times New Roman" panose="02020603050405020304" pitchFamily="18" charset="0"/>
+              </a:rPr>
+              <a:t>trang</a:t>
+            </a:r>
+            <a:r>
+              <a:rPr lang="en-US" sz="3000" dirty="0">
+                <a:solidFill>
+                  <a:schemeClr val="tx1"/>
+                </a:solidFill>
+                <a:latin typeface="Times New Roman" panose="02020603050405020304" pitchFamily="18" charset="0"/>
+                <a:cs typeface="Times New Roman" panose="02020603050405020304" pitchFamily="18" charset="0"/>
+              </a:rPr>
+              <a:t> </a:t>
+            </a:r>
+            <a:r>
+              <a:rPr lang="en-US" sz="3000" dirty="0" err="1">
+                <a:solidFill>
+                  <a:schemeClr val="tx1"/>
+                </a:solidFill>
+                <a:latin typeface="Times New Roman" panose="02020603050405020304" pitchFamily="18" charset="0"/>
+                <a:cs typeface="Times New Roman" panose="02020603050405020304" pitchFamily="18" charset="0"/>
+              </a:rPr>
+              <a:t>bằng</a:t>
+            </a:r>
+            <a:r>
+              <a:rPr lang="en-US" sz="3000" dirty="0">
+                <a:solidFill>
+                  <a:schemeClr val="tx1"/>
+                </a:solidFill>
+                <a:latin typeface="Times New Roman" panose="02020603050405020304" pitchFamily="18" charset="0"/>
+                <a:cs typeface="Times New Roman" panose="02020603050405020304" pitchFamily="18" charset="0"/>
+              </a:rPr>
+              <a:t> </a:t>
+            </a:r>
+            <a:r>
+              <a:rPr lang="en-US" sz="3000" dirty="0" err="1">
+                <a:solidFill>
+                  <a:schemeClr val="tx1"/>
+                </a:solidFill>
+                <a:latin typeface="Times New Roman" panose="02020603050405020304" pitchFamily="18" charset="0"/>
+                <a:cs typeface="Times New Roman" panose="02020603050405020304" pitchFamily="18" charset="0"/>
+              </a:rPr>
+              <a:t>cách</a:t>
+            </a:r>
+            <a:r>
+              <a:rPr lang="en-US" sz="3000" dirty="0">
+                <a:solidFill>
+                  <a:schemeClr val="tx1"/>
+                </a:solidFill>
+                <a:latin typeface="Times New Roman" panose="02020603050405020304" pitchFamily="18" charset="0"/>
+                <a:cs typeface="Times New Roman" panose="02020603050405020304" pitchFamily="18" charset="0"/>
+              </a:rPr>
+              <a:t>: Minify </a:t>
+            </a:r>
+            <a:r>
+              <a:rPr lang="en-US" sz="3000" dirty="0" err="1">
+                <a:solidFill>
+                  <a:schemeClr val="tx1"/>
+                </a:solidFill>
+                <a:latin typeface="Times New Roman" panose="02020603050405020304" pitchFamily="18" charset="0"/>
+                <a:cs typeface="Times New Roman" panose="02020603050405020304" pitchFamily="18" charset="0"/>
+              </a:rPr>
+              <a:t>các</a:t>
+            </a:r>
+            <a:r>
+              <a:rPr lang="en-US" sz="3000" dirty="0">
+                <a:solidFill>
+                  <a:schemeClr val="tx1"/>
+                </a:solidFill>
+                <a:latin typeface="Times New Roman" panose="02020603050405020304" pitchFamily="18" charset="0"/>
+                <a:cs typeface="Times New Roman" panose="02020603050405020304" pitchFamily="18" charset="0"/>
+              </a:rPr>
+              <a:t> file JS, CSS. </a:t>
+            </a:r>
+            <a:r>
+              <a:rPr lang="en-US" sz="3000" dirty="0" err="1">
+                <a:solidFill>
+                  <a:schemeClr val="tx1"/>
+                </a:solidFill>
+                <a:latin typeface="Times New Roman" panose="02020603050405020304" pitchFamily="18" charset="0"/>
+                <a:cs typeface="Times New Roman" panose="02020603050405020304" pitchFamily="18" charset="0"/>
+              </a:rPr>
+              <a:t>Áp</a:t>
+            </a:r>
+            <a:r>
+              <a:rPr lang="en-US" sz="3000" dirty="0">
+                <a:solidFill>
+                  <a:schemeClr val="tx1"/>
+                </a:solidFill>
+                <a:latin typeface="Times New Roman" panose="02020603050405020304" pitchFamily="18" charset="0"/>
+                <a:cs typeface="Times New Roman" panose="02020603050405020304" pitchFamily="18" charset="0"/>
+              </a:rPr>
+              <a:t> </a:t>
+            </a:r>
+            <a:r>
+              <a:rPr lang="en-US" sz="3000" dirty="0" err="1">
+                <a:solidFill>
+                  <a:schemeClr val="tx1"/>
+                </a:solidFill>
+                <a:latin typeface="Times New Roman" panose="02020603050405020304" pitchFamily="18" charset="0"/>
+                <a:cs typeface="Times New Roman" panose="02020603050405020304" pitchFamily="18" charset="0"/>
+              </a:rPr>
+              <a:t>dụng</a:t>
+            </a:r>
+            <a:r>
+              <a:rPr lang="en-US" sz="3000" dirty="0">
+                <a:solidFill>
+                  <a:schemeClr val="tx1"/>
+                </a:solidFill>
+                <a:latin typeface="Times New Roman" panose="02020603050405020304" pitchFamily="18" charset="0"/>
+                <a:cs typeface="Times New Roman" panose="02020603050405020304" pitchFamily="18" charset="0"/>
+              </a:rPr>
+              <a:t> lazy loading.</a:t>
+            </a:r>
+          </a:p>
+          <a:p>
+            <a:pPr marL="285750" lvl="0" indent="-285750">
+              <a:buFont typeface="Wingdings" panose="05000000000000000000" pitchFamily="2" charset="2"/>
+              <a:buChar char="Ø"/>
+            </a:pPr>
+            <a:r>
+              <a:rPr lang="en-US" sz="3000" dirty="0" err="1">
+                <a:solidFill>
+                  <a:schemeClr val="tx1"/>
+                </a:solidFill>
+                <a:latin typeface="Times New Roman" panose="02020603050405020304" pitchFamily="18" charset="0"/>
+                <a:cs typeface="Times New Roman" panose="02020603050405020304" pitchFamily="18" charset="0"/>
+              </a:rPr>
+              <a:t>Tăng</a:t>
+            </a:r>
+            <a:r>
+              <a:rPr lang="en-US" sz="3000" dirty="0">
+                <a:solidFill>
+                  <a:schemeClr val="tx1"/>
+                </a:solidFill>
+                <a:latin typeface="Times New Roman" panose="02020603050405020304" pitchFamily="18" charset="0"/>
+                <a:cs typeface="Times New Roman" panose="02020603050405020304" pitchFamily="18" charset="0"/>
+              </a:rPr>
+              <a:t> </a:t>
+            </a:r>
+            <a:r>
+              <a:rPr lang="en-US" sz="3000" dirty="0" err="1">
+                <a:solidFill>
+                  <a:schemeClr val="tx1"/>
+                </a:solidFill>
+                <a:latin typeface="Times New Roman" panose="02020603050405020304" pitchFamily="18" charset="0"/>
+                <a:cs typeface="Times New Roman" panose="02020603050405020304" pitchFamily="18" charset="0"/>
+              </a:rPr>
+              <a:t>cường</a:t>
+            </a:r>
+            <a:r>
+              <a:rPr lang="en-US" sz="3000" dirty="0">
+                <a:solidFill>
+                  <a:schemeClr val="tx1"/>
+                </a:solidFill>
+                <a:latin typeface="Times New Roman" panose="02020603050405020304" pitchFamily="18" charset="0"/>
+                <a:cs typeface="Times New Roman" panose="02020603050405020304" pitchFamily="18" charset="0"/>
+              </a:rPr>
+              <a:t> </a:t>
+            </a:r>
+            <a:r>
+              <a:rPr lang="en-US" sz="3000" dirty="0" err="1">
+                <a:solidFill>
+                  <a:schemeClr val="tx1"/>
+                </a:solidFill>
+                <a:latin typeface="Times New Roman" panose="02020603050405020304" pitchFamily="18" charset="0"/>
+                <a:cs typeface="Times New Roman" panose="02020603050405020304" pitchFamily="18" charset="0"/>
+              </a:rPr>
+              <a:t>bảo</a:t>
+            </a:r>
+            <a:r>
+              <a:rPr lang="en-US" sz="3000" dirty="0">
+                <a:solidFill>
+                  <a:schemeClr val="tx1"/>
+                </a:solidFill>
+                <a:latin typeface="Times New Roman" panose="02020603050405020304" pitchFamily="18" charset="0"/>
+                <a:cs typeface="Times New Roman" panose="02020603050405020304" pitchFamily="18" charset="0"/>
+              </a:rPr>
+              <a:t> </a:t>
+            </a:r>
+            <a:r>
+              <a:rPr lang="en-US" sz="3000" dirty="0" err="1">
+                <a:solidFill>
+                  <a:schemeClr val="tx1"/>
+                </a:solidFill>
+                <a:latin typeface="Times New Roman" panose="02020603050405020304" pitchFamily="18" charset="0"/>
+                <a:cs typeface="Times New Roman" panose="02020603050405020304" pitchFamily="18" charset="0"/>
+              </a:rPr>
+              <a:t>mật</a:t>
+            </a:r>
+            <a:r>
+              <a:rPr lang="en-US" sz="3000" dirty="0">
+                <a:solidFill>
+                  <a:schemeClr val="tx1"/>
+                </a:solidFill>
+                <a:latin typeface="Times New Roman" panose="02020603050405020304" pitchFamily="18" charset="0"/>
+                <a:cs typeface="Times New Roman" panose="02020603050405020304" pitchFamily="18" charset="0"/>
+              </a:rPr>
+              <a:t>.</a:t>
+            </a:r>
+          </a:p>
+          <a:p>
+            <a:pPr marL="285750" lvl="0" indent="-285750">
+              <a:buFont typeface="Wingdings" panose="05000000000000000000" pitchFamily="2" charset="2"/>
+              <a:buChar char="Ø"/>
+            </a:pPr>
+            <a:r>
+              <a:rPr lang="en-US" sz="3000" dirty="0" err="1">
+                <a:solidFill>
+                  <a:schemeClr val="tx1"/>
+                </a:solidFill>
+                <a:latin typeface="Times New Roman" panose="02020603050405020304" pitchFamily="18" charset="0"/>
+                <a:cs typeface="Times New Roman" panose="02020603050405020304" pitchFamily="18" charset="0"/>
+              </a:rPr>
+              <a:t>Xây</a:t>
+            </a:r>
+            <a:r>
+              <a:rPr lang="en-US" sz="3000" dirty="0">
+                <a:solidFill>
+                  <a:schemeClr val="tx1"/>
+                </a:solidFill>
+                <a:latin typeface="Times New Roman" panose="02020603050405020304" pitchFamily="18" charset="0"/>
+                <a:cs typeface="Times New Roman" panose="02020603050405020304" pitchFamily="18" charset="0"/>
+              </a:rPr>
+              <a:t> </a:t>
+            </a:r>
+            <a:r>
+              <a:rPr lang="en-US" sz="3000" dirty="0" err="1">
+                <a:solidFill>
+                  <a:schemeClr val="tx1"/>
+                </a:solidFill>
+                <a:latin typeface="Times New Roman" panose="02020603050405020304" pitchFamily="18" charset="0"/>
+                <a:cs typeface="Times New Roman" panose="02020603050405020304" pitchFamily="18" charset="0"/>
+              </a:rPr>
+              <a:t>dựng</a:t>
+            </a:r>
+            <a:r>
+              <a:rPr lang="en-US" sz="3000" dirty="0">
+                <a:solidFill>
+                  <a:schemeClr val="tx1"/>
+                </a:solidFill>
+                <a:latin typeface="Times New Roman" panose="02020603050405020304" pitchFamily="18" charset="0"/>
+                <a:cs typeface="Times New Roman" panose="02020603050405020304" pitchFamily="18" charset="0"/>
+              </a:rPr>
+              <a:t> </a:t>
+            </a:r>
+            <a:r>
+              <a:rPr lang="en-US" sz="3000" dirty="0" err="1">
+                <a:solidFill>
+                  <a:schemeClr val="tx1"/>
+                </a:solidFill>
+                <a:latin typeface="Times New Roman" panose="02020603050405020304" pitchFamily="18" charset="0"/>
+                <a:cs typeface="Times New Roman" panose="02020603050405020304" pitchFamily="18" charset="0"/>
+              </a:rPr>
+              <a:t>hoàn</a:t>
+            </a:r>
+            <a:r>
+              <a:rPr lang="en-US" sz="3000" dirty="0">
+                <a:solidFill>
+                  <a:schemeClr val="tx1"/>
+                </a:solidFill>
+                <a:latin typeface="Times New Roman" panose="02020603050405020304" pitchFamily="18" charset="0"/>
+                <a:cs typeface="Times New Roman" panose="02020603050405020304" pitchFamily="18" charset="0"/>
+              </a:rPr>
+              <a:t> </a:t>
+            </a:r>
+            <a:r>
+              <a:rPr lang="en-US" sz="3000" dirty="0" err="1">
+                <a:solidFill>
+                  <a:schemeClr val="tx1"/>
+                </a:solidFill>
+                <a:latin typeface="Times New Roman" panose="02020603050405020304" pitchFamily="18" charset="0"/>
+                <a:cs typeface="Times New Roman" panose="02020603050405020304" pitchFamily="18" charset="0"/>
+              </a:rPr>
+              <a:t>thiện</a:t>
+            </a:r>
+            <a:r>
+              <a:rPr lang="en-US" sz="3000" dirty="0">
+                <a:solidFill>
+                  <a:schemeClr val="tx1"/>
+                </a:solidFill>
+                <a:latin typeface="Times New Roman" panose="02020603050405020304" pitchFamily="18" charset="0"/>
+                <a:cs typeface="Times New Roman" panose="02020603050405020304" pitchFamily="18" charset="0"/>
+              </a:rPr>
+              <a:t> </a:t>
+            </a:r>
+            <a:r>
+              <a:rPr lang="en-US" sz="3000" dirty="0" err="1">
+                <a:solidFill>
+                  <a:schemeClr val="tx1"/>
+                </a:solidFill>
+                <a:latin typeface="Times New Roman" panose="02020603050405020304" pitchFamily="18" charset="0"/>
+                <a:cs typeface="Times New Roman" panose="02020603050405020304" pitchFamily="18" charset="0"/>
+              </a:rPr>
+              <a:t>các</a:t>
+            </a:r>
+            <a:r>
+              <a:rPr lang="en-US" sz="3000" dirty="0">
+                <a:solidFill>
+                  <a:schemeClr val="tx1"/>
+                </a:solidFill>
+                <a:latin typeface="Times New Roman" panose="02020603050405020304" pitchFamily="18" charset="0"/>
+                <a:cs typeface="Times New Roman" panose="02020603050405020304" pitchFamily="18" charset="0"/>
+              </a:rPr>
+              <a:t> </a:t>
+            </a:r>
+            <a:r>
+              <a:rPr lang="en-US" sz="3000" dirty="0" err="1">
+                <a:solidFill>
+                  <a:schemeClr val="tx1"/>
+                </a:solidFill>
+                <a:latin typeface="Times New Roman" panose="02020603050405020304" pitchFamily="18" charset="0"/>
+                <a:cs typeface="Times New Roman" panose="02020603050405020304" pitchFamily="18" charset="0"/>
+              </a:rPr>
+              <a:t>tính</a:t>
+            </a:r>
+            <a:r>
+              <a:rPr lang="en-US" sz="3000" dirty="0">
+                <a:solidFill>
+                  <a:schemeClr val="tx1"/>
+                </a:solidFill>
+                <a:latin typeface="Times New Roman" panose="02020603050405020304" pitchFamily="18" charset="0"/>
+                <a:cs typeface="Times New Roman" panose="02020603050405020304" pitchFamily="18" charset="0"/>
+              </a:rPr>
+              <a:t> </a:t>
+            </a:r>
+            <a:r>
+              <a:rPr lang="en-US" sz="3000" dirty="0" err="1">
+                <a:solidFill>
+                  <a:schemeClr val="tx1"/>
+                </a:solidFill>
+                <a:latin typeface="Times New Roman" panose="02020603050405020304" pitchFamily="18" charset="0"/>
+                <a:cs typeface="Times New Roman" panose="02020603050405020304" pitchFamily="18" charset="0"/>
+              </a:rPr>
+              <a:t>năng</a:t>
+            </a:r>
+            <a:r>
+              <a:rPr lang="en-US" sz="3000" dirty="0">
+                <a:solidFill>
+                  <a:schemeClr val="tx1"/>
+                </a:solidFill>
+                <a:latin typeface="Times New Roman" panose="02020603050405020304" pitchFamily="18" charset="0"/>
+                <a:cs typeface="Times New Roman" panose="02020603050405020304" pitchFamily="18" charset="0"/>
+              </a:rPr>
+              <a:t> </a:t>
+            </a:r>
+            <a:r>
+              <a:rPr lang="en-US" sz="3000" dirty="0" err="1">
+                <a:solidFill>
+                  <a:schemeClr val="tx1"/>
+                </a:solidFill>
+                <a:latin typeface="Times New Roman" panose="02020603050405020304" pitchFamily="18" charset="0"/>
+                <a:cs typeface="Times New Roman" panose="02020603050405020304" pitchFamily="18" charset="0"/>
+              </a:rPr>
+              <a:t>còn</a:t>
+            </a:r>
+            <a:r>
+              <a:rPr lang="en-US" sz="3000" dirty="0">
+                <a:solidFill>
+                  <a:schemeClr val="tx1"/>
+                </a:solidFill>
+                <a:latin typeface="Times New Roman" panose="02020603050405020304" pitchFamily="18" charset="0"/>
+                <a:cs typeface="Times New Roman" panose="02020603050405020304" pitchFamily="18" charset="0"/>
+              </a:rPr>
+              <a:t> </a:t>
+            </a:r>
+            <a:r>
+              <a:rPr lang="en-US" sz="3000" dirty="0" err="1">
+                <a:solidFill>
+                  <a:schemeClr val="tx1"/>
+                </a:solidFill>
+                <a:latin typeface="Times New Roman" panose="02020603050405020304" pitchFamily="18" charset="0"/>
+                <a:cs typeface="Times New Roman" panose="02020603050405020304" pitchFamily="18" charset="0"/>
+              </a:rPr>
+              <a:t>thiếu</a:t>
+            </a:r>
+            <a:r>
+              <a:rPr lang="en-US" sz="3000" dirty="0">
+                <a:solidFill>
+                  <a:schemeClr val="tx1"/>
+                </a:solidFill>
+                <a:latin typeface="Times New Roman" panose="02020603050405020304" pitchFamily="18" charset="0"/>
+                <a:cs typeface="Times New Roman" panose="02020603050405020304" pitchFamily="18" charset="0"/>
+              </a:rPr>
+              <a:t>: </a:t>
+            </a:r>
+            <a:r>
+              <a:rPr lang="en-US" sz="3000" dirty="0" err="1">
+                <a:solidFill>
+                  <a:schemeClr val="tx1"/>
+                </a:solidFill>
+                <a:latin typeface="Times New Roman" panose="02020603050405020304" pitchFamily="18" charset="0"/>
+                <a:cs typeface="Times New Roman" panose="02020603050405020304" pitchFamily="18" charset="0"/>
+              </a:rPr>
+              <a:t>nhập</a:t>
+            </a:r>
+            <a:r>
+              <a:rPr lang="en-US" sz="3000" dirty="0">
+                <a:solidFill>
+                  <a:schemeClr val="tx1"/>
+                </a:solidFill>
+                <a:latin typeface="Times New Roman" panose="02020603050405020304" pitchFamily="18" charset="0"/>
+                <a:cs typeface="Times New Roman" panose="02020603050405020304" pitchFamily="18" charset="0"/>
+              </a:rPr>
+              <a:t> </a:t>
+            </a:r>
+            <a:r>
+              <a:rPr lang="en-US" sz="3000" dirty="0" err="1">
+                <a:solidFill>
+                  <a:schemeClr val="tx1"/>
+                </a:solidFill>
+                <a:latin typeface="Times New Roman" panose="02020603050405020304" pitchFamily="18" charset="0"/>
+                <a:cs typeface="Times New Roman" panose="02020603050405020304" pitchFamily="18" charset="0"/>
+              </a:rPr>
+              <a:t>xuất</a:t>
+            </a:r>
+            <a:r>
+              <a:rPr lang="en-US" sz="3000" dirty="0">
+                <a:solidFill>
+                  <a:schemeClr val="tx1"/>
+                </a:solidFill>
+                <a:latin typeface="Times New Roman" panose="02020603050405020304" pitchFamily="18" charset="0"/>
+                <a:cs typeface="Times New Roman" panose="02020603050405020304" pitchFamily="18" charset="0"/>
+              </a:rPr>
+              <a:t> </a:t>
+            </a:r>
+            <a:r>
+              <a:rPr lang="en-US" sz="3000" dirty="0" err="1">
+                <a:solidFill>
+                  <a:schemeClr val="tx1"/>
+                </a:solidFill>
+                <a:latin typeface="Times New Roman" panose="02020603050405020304" pitchFamily="18" charset="0"/>
+                <a:cs typeface="Times New Roman" panose="02020603050405020304" pitchFamily="18" charset="0"/>
+              </a:rPr>
+              <a:t>dữ</a:t>
+            </a:r>
+            <a:r>
+              <a:rPr lang="en-US" sz="3000" dirty="0">
+                <a:solidFill>
+                  <a:schemeClr val="tx1"/>
+                </a:solidFill>
+                <a:latin typeface="Times New Roman" panose="02020603050405020304" pitchFamily="18" charset="0"/>
+                <a:cs typeface="Times New Roman" panose="02020603050405020304" pitchFamily="18" charset="0"/>
+              </a:rPr>
+              <a:t> </a:t>
+            </a:r>
+            <a:r>
+              <a:rPr lang="en-US" sz="3000" dirty="0" err="1">
+                <a:solidFill>
+                  <a:schemeClr val="tx1"/>
+                </a:solidFill>
+                <a:latin typeface="Times New Roman" panose="02020603050405020304" pitchFamily="18" charset="0"/>
+                <a:cs typeface="Times New Roman" panose="02020603050405020304" pitchFamily="18" charset="0"/>
+              </a:rPr>
+              <a:t>liệu</a:t>
+            </a:r>
+            <a:r>
+              <a:rPr lang="en-US" sz="3000" dirty="0">
+                <a:solidFill>
+                  <a:schemeClr val="tx1"/>
+                </a:solidFill>
+                <a:latin typeface="Times New Roman" panose="02020603050405020304" pitchFamily="18" charset="0"/>
+                <a:cs typeface="Times New Roman" panose="02020603050405020304" pitchFamily="18" charset="0"/>
+              </a:rPr>
+              <a:t> </a:t>
+            </a:r>
+            <a:r>
+              <a:rPr lang="en-US" sz="3000" dirty="0" err="1">
+                <a:solidFill>
+                  <a:schemeClr val="tx1"/>
+                </a:solidFill>
+                <a:latin typeface="Times New Roman" panose="02020603050405020304" pitchFamily="18" charset="0"/>
+                <a:cs typeface="Times New Roman" panose="02020603050405020304" pitchFamily="18" charset="0"/>
+              </a:rPr>
+              <a:t>từ</a:t>
+            </a:r>
+            <a:r>
+              <a:rPr lang="en-US" sz="3000" dirty="0">
+                <a:solidFill>
+                  <a:schemeClr val="tx1"/>
+                </a:solidFill>
+                <a:latin typeface="Times New Roman" panose="02020603050405020304" pitchFamily="18" charset="0"/>
+                <a:cs typeface="Times New Roman" panose="02020603050405020304" pitchFamily="18" charset="0"/>
+              </a:rPr>
+              <a:t> file excel, </a:t>
+            </a:r>
+            <a:r>
+              <a:rPr lang="en-US" sz="3000" dirty="0" err="1">
+                <a:solidFill>
+                  <a:schemeClr val="tx1"/>
+                </a:solidFill>
+                <a:latin typeface="Times New Roman" panose="02020603050405020304" pitchFamily="18" charset="0"/>
+                <a:cs typeface="Times New Roman" panose="02020603050405020304" pitchFamily="18" charset="0"/>
+              </a:rPr>
+              <a:t>chức</a:t>
+            </a:r>
+            <a:r>
+              <a:rPr lang="en-US" sz="3000" dirty="0">
+                <a:solidFill>
+                  <a:schemeClr val="tx1"/>
+                </a:solidFill>
+                <a:latin typeface="Times New Roman" panose="02020603050405020304" pitchFamily="18" charset="0"/>
+                <a:cs typeface="Times New Roman" panose="02020603050405020304" pitchFamily="18" charset="0"/>
+              </a:rPr>
+              <a:t> </a:t>
+            </a:r>
+            <a:r>
+              <a:rPr lang="en-US" sz="3000" dirty="0" err="1">
+                <a:solidFill>
+                  <a:schemeClr val="tx1"/>
+                </a:solidFill>
+                <a:latin typeface="Times New Roman" panose="02020603050405020304" pitchFamily="18" charset="0"/>
+                <a:cs typeface="Times New Roman" panose="02020603050405020304" pitchFamily="18" charset="0"/>
+              </a:rPr>
+              <a:t>năng</a:t>
+            </a:r>
+            <a:r>
+              <a:rPr lang="en-US" sz="3000" dirty="0">
+                <a:solidFill>
+                  <a:schemeClr val="tx1"/>
+                </a:solidFill>
+                <a:latin typeface="Times New Roman" panose="02020603050405020304" pitchFamily="18" charset="0"/>
+                <a:cs typeface="Times New Roman" panose="02020603050405020304" pitchFamily="18" charset="0"/>
+              </a:rPr>
+              <a:t> in.</a:t>
+            </a:r>
+          </a:p>
+          <a:p>
+            <a:pPr marL="285750" lvl="0" indent="-285750">
+              <a:buFont typeface="Wingdings" panose="05000000000000000000" pitchFamily="2" charset="2"/>
+              <a:buChar char="Ø"/>
+            </a:pPr>
+            <a:r>
+              <a:rPr lang="en-US" sz="3000" dirty="0" err="1">
+                <a:solidFill>
+                  <a:schemeClr val="tx1"/>
+                </a:solidFill>
+                <a:latin typeface="Times New Roman" panose="02020603050405020304" pitchFamily="18" charset="0"/>
+                <a:cs typeface="Times New Roman" panose="02020603050405020304" pitchFamily="18" charset="0"/>
+              </a:rPr>
+              <a:t>Hoàn</a:t>
+            </a:r>
+            <a:r>
+              <a:rPr lang="en-US" sz="3000" dirty="0">
+                <a:solidFill>
+                  <a:schemeClr val="tx1"/>
+                </a:solidFill>
+                <a:latin typeface="Times New Roman" panose="02020603050405020304" pitchFamily="18" charset="0"/>
+                <a:cs typeface="Times New Roman" panose="02020603050405020304" pitchFamily="18" charset="0"/>
+              </a:rPr>
+              <a:t> </a:t>
+            </a:r>
+            <a:r>
+              <a:rPr lang="en-US" sz="3000" dirty="0" err="1">
+                <a:solidFill>
+                  <a:schemeClr val="tx1"/>
+                </a:solidFill>
+                <a:latin typeface="Times New Roman" panose="02020603050405020304" pitchFamily="18" charset="0"/>
+                <a:cs typeface="Times New Roman" panose="02020603050405020304" pitchFamily="18" charset="0"/>
+              </a:rPr>
+              <a:t>thiện</a:t>
+            </a:r>
+            <a:r>
+              <a:rPr lang="en-US" sz="3000" dirty="0">
+                <a:solidFill>
+                  <a:schemeClr val="tx1"/>
+                </a:solidFill>
+                <a:latin typeface="Times New Roman" panose="02020603050405020304" pitchFamily="18" charset="0"/>
+                <a:cs typeface="Times New Roman" panose="02020603050405020304" pitchFamily="18" charset="0"/>
+              </a:rPr>
+              <a:t> </a:t>
+            </a:r>
+            <a:r>
+              <a:rPr lang="en-US" sz="3000" dirty="0" err="1">
+                <a:solidFill>
+                  <a:schemeClr val="tx1"/>
+                </a:solidFill>
+                <a:latin typeface="Times New Roman" panose="02020603050405020304" pitchFamily="18" charset="0"/>
+                <a:cs typeface="Times New Roman" panose="02020603050405020304" pitchFamily="18" charset="0"/>
+              </a:rPr>
+              <a:t>quản</a:t>
+            </a:r>
+            <a:r>
+              <a:rPr lang="en-US" sz="3000" dirty="0">
+                <a:solidFill>
+                  <a:schemeClr val="tx1"/>
+                </a:solidFill>
+                <a:latin typeface="Times New Roman" panose="02020603050405020304" pitchFamily="18" charset="0"/>
+                <a:cs typeface="Times New Roman" panose="02020603050405020304" pitchFamily="18" charset="0"/>
+              </a:rPr>
+              <a:t> </a:t>
+            </a:r>
+            <a:r>
+              <a:rPr lang="en-US" sz="3000" dirty="0" err="1">
+                <a:solidFill>
+                  <a:schemeClr val="tx1"/>
+                </a:solidFill>
+                <a:latin typeface="Times New Roman" panose="02020603050405020304" pitchFamily="18" charset="0"/>
+                <a:cs typeface="Times New Roman" panose="02020603050405020304" pitchFamily="18" charset="0"/>
+              </a:rPr>
+              <a:t>lý</a:t>
+            </a:r>
+            <a:r>
+              <a:rPr lang="en-US" sz="3000" dirty="0">
+                <a:solidFill>
+                  <a:schemeClr val="tx1"/>
+                </a:solidFill>
+                <a:latin typeface="Times New Roman" panose="02020603050405020304" pitchFamily="18" charset="0"/>
+                <a:cs typeface="Times New Roman" panose="02020603050405020304" pitchFamily="18" charset="0"/>
+              </a:rPr>
+              <a:t> </a:t>
+            </a:r>
+            <a:r>
+              <a:rPr lang="en-US" sz="3000" dirty="0" err="1">
+                <a:solidFill>
+                  <a:schemeClr val="tx1"/>
+                </a:solidFill>
+                <a:latin typeface="Times New Roman" panose="02020603050405020304" pitchFamily="18" charset="0"/>
+                <a:cs typeface="Times New Roman" panose="02020603050405020304" pitchFamily="18" charset="0"/>
+              </a:rPr>
+              <a:t>hàng</a:t>
+            </a:r>
+            <a:r>
+              <a:rPr lang="en-US" sz="3000" dirty="0">
+                <a:solidFill>
+                  <a:schemeClr val="tx1"/>
+                </a:solidFill>
+                <a:latin typeface="Times New Roman" panose="02020603050405020304" pitchFamily="18" charset="0"/>
+                <a:cs typeface="Times New Roman" panose="02020603050405020304" pitchFamily="18" charset="0"/>
+              </a:rPr>
+              <a:t> </a:t>
+            </a:r>
+            <a:r>
+              <a:rPr lang="en-US" sz="3000" dirty="0" err="1">
+                <a:solidFill>
+                  <a:schemeClr val="tx1"/>
+                </a:solidFill>
+                <a:latin typeface="Times New Roman" panose="02020603050405020304" pitchFamily="18" charset="0"/>
+                <a:cs typeface="Times New Roman" panose="02020603050405020304" pitchFamily="18" charset="0"/>
+              </a:rPr>
+              <a:t>hóa</a:t>
+            </a:r>
+            <a:r>
+              <a:rPr lang="en-US" sz="3000" dirty="0">
+                <a:solidFill>
+                  <a:schemeClr val="tx1"/>
+                </a:solidFill>
+                <a:latin typeface="Times New Roman" panose="02020603050405020304" pitchFamily="18" charset="0"/>
+                <a:cs typeface="Times New Roman" panose="02020603050405020304" pitchFamily="18" charset="0"/>
+              </a:rPr>
+              <a:t>, </a:t>
+            </a:r>
+            <a:r>
+              <a:rPr lang="en-US" sz="3000" dirty="0" err="1">
+                <a:solidFill>
+                  <a:schemeClr val="tx1"/>
+                </a:solidFill>
+                <a:latin typeface="Times New Roman" panose="02020603050405020304" pitchFamily="18" charset="0"/>
+                <a:cs typeface="Times New Roman" panose="02020603050405020304" pitchFamily="18" charset="0"/>
+              </a:rPr>
+              <a:t>đơn</a:t>
+            </a:r>
+            <a:r>
+              <a:rPr lang="en-US" sz="3000" dirty="0">
+                <a:solidFill>
+                  <a:schemeClr val="tx1"/>
+                </a:solidFill>
+                <a:latin typeface="Times New Roman" panose="02020603050405020304" pitchFamily="18" charset="0"/>
+                <a:cs typeface="Times New Roman" panose="02020603050405020304" pitchFamily="18" charset="0"/>
+              </a:rPr>
+              <a:t> </a:t>
+            </a:r>
+            <a:r>
+              <a:rPr lang="en-US" sz="3000" dirty="0" err="1">
+                <a:solidFill>
+                  <a:schemeClr val="tx1"/>
+                </a:solidFill>
+                <a:latin typeface="Times New Roman" panose="02020603050405020304" pitchFamily="18" charset="0"/>
+                <a:cs typeface="Times New Roman" panose="02020603050405020304" pitchFamily="18" charset="0"/>
+              </a:rPr>
+              <a:t>hàng</a:t>
+            </a:r>
+            <a:r>
+              <a:rPr lang="en-US" sz="3000" dirty="0">
+                <a:solidFill>
+                  <a:schemeClr val="tx1"/>
+                </a:solidFill>
+                <a:latin typeface="Times New Roman" panose="02020603050405020304" pitchFamily="18" charset="0"/>
+                <a:cs typeface="Times New Roman" panose="02020603050405020304" pitchFamily="18" charset="0"/>
+              </a:rPr>
+              <a:t>, con </a:t>
+            </a:r>
+            <a:r>
+              <a:rPr lang="en-US" sz="3000" dirty="0" err="1">
+                <a:solidFill>
+                  <a:schemeClr val="tx1"/>
+                </a:solidFill>
+                <a:latin typeface="Times New Roman" panose="02020603050405020304" pitchFamily="18" charset="0"/>
+                <a:cs typeface="Times New Roman" panose="02020603050405020304" pitchFamily="18" charset="0"/>
+              </a:rPr>
+              <a:t>người</a:t>
+            </a:r>
+            <a:r>
+              <a:rPr lang="en-US" sz="3000" dirty="0">
+                <a:solidFill>
+                  <a:schemeClr val="tx1"/>
+                </a:solidFill>
+                <a:latin typeface="Times New Roman" panose="02020603050405020304" pitchFamily="18" charset="0"/>
+                <a:cs typeface="Times New Roman" panose="02020603050405020304" pitchFamily="18" charset="0"/>
+              </a:rPr>
+              <a:t>,… </a:t>
+            </a:r>
+            <a:r>
+              <a:rPr lang="en-US" sz="3000" dirty="0" err="1">
+                <a:solidFill>
+                  <a:schemeClr val="tx1"/>
+                </a:solidFill>
+                <a:latin typeface="Times New Roman" panose="02020603050405020304" pitchFamily="18" charset="0"/>
+                <a:cs typeface="Times New Roman" panose="02020603050405020304" pitchFamily="18" charset="0"/>
+              </a:rPr>
+              <a:t>theo</a:t>
+            </a:r>
+            <a:r>
+              <a:rPr lang="en-US" sz="3000" dirty="0">
+                <a:solidFill>
+                  <a:schemeClr val="tx1"/>
+                </a:solidFill>
+                <a:latin typeface="Times New Roman" panose="02020603050405020304" pitchFamily="18" charset="0"/>
+                <a:cs typeface="Times New Roman" panose="02020603050405020304" pitchFamily="18" charset="0"/>
+              </a:rPr>
+              <a:t> chi </a:t>
+            </a:r>
+            <a:r>
+              <a:rPr lang="en-US" sz="3000" dirty="0" err="1">
+                <a:solidFill>
+                  <a:schemeClr val="tx1"/>
+                </a:solidFill>
+                <a:latin typeface="Times New Roman" panose="02020603050405020304" pitchFamily="18" charset="0"/>
+                <a:cs typeface="Times New Roman" panose="02020603050405020304" pitchFamily="18" charset="0"/>
+              </a:rPr>
+              <a:t>nhánh</a:t>
+            </a:r>
+            <a:r>
+              <a:rPr lang="en-US" sz="3000" dirty="0">
+                <a:solidFill>
+                  <a:schemeClr val="tx1"/>
+                </a:solidFill>
+                <a:latin typeface="Times New Roman" panose="02020603050405020304" pitchFamily="18" charset="0"/>
+                <a:cs typeface="Times New Roman" panose="02020603050405020304" pitchFamily="18" charset="0"/>
+              </a:rPr>
+              <a:t>.</a:t>
+            </a:r>
+          </a:p>
+          <a:p>
+            <a:pPr marL="285750" lvl="0" indent="-285750">
+              <a:buFont typeface="Wingdings" panose="05000000000000000000" pitchFamily="2" charset="2"/>
+              <a:buChar char="Ø"/>
+            </a:pPr>
+            <a:r>
+              <a:rPr lang="en-US" sz="3000" dirty="0" err="1">
+                <a:solidFill>
+                  <a:schemeClr val="tx1"/>
+                </a:solidFill>
+                <a:latin typeface="Times New Roman" panose="02020603050405020304" pitchFamily="18" charset="0"/>
+                <a:cs typeface="Times New Roman" panose="02020603050405020304" pitchFamily="18" charset="0"/>
+              </a:rPr>
+              <a:t>Xây</a:t>
+            </a:r>
+            <a:r>
+              <a:rPr lang="en-US" sz="3000" dirty="0">
+                <a:solidFill>
+                  <a:schemeClr val="tx1"/>
+                </a:solidFill>
+                <a:latin typeface="Times New Roman" panose="02020603050405020304" pitchFamily="18" charset="0"/>
+                <a:cs typeface="Times New Roman" panose="02020603050405020304" pitchFamily="18" charset="0"/>
+              </a:rPr>
+              <a:t> </a:t>
+            </a:r>
+            <a:r>
+              <a:rPr lang="en-US" sz="3000" dirty="0" err="1">
+                <a:solidFill>
+                  <a:schemeClr val="tx1"/>
+                </a:solidFill>
+                <a:latin typeface="Times New Roman" panose="02020603050405020304" pitchFamily="18" charset="0"/>
+                <a:cs typeface="Times New Roman" panose="02020603050405020304" pitchFamily="18" charset="0"/>
+              </a:rPr>
+              <a:t>dựng</a:t>
+            </a:r>
+            <a:r>
+              <a:rPr lang="en-US" sz="3000" dirty="0">
+                <a:solidFill>
+                  <a:schemeClr val="tx1"/>
+                </a:solidFill>
+                <a:latin typeface="Times New Roman" panose="02020603050405020304" pitchFamily="18" charset="0"/>
+                <a:cs typeface="Times New Roman" panose="02020603050405020304" pitchFamily="18" charset="0"/>
+              </a:rPr>
+              <a:t> </a:t>
+            </a:r>
+            <a:r>
+              <a:rPr lang="en-US" sz="3000" dirty="0" err="1">
+                <a:solidFill>
+                  <a:schemeClr val="tx1"/>
+                </a:solidFill>
+                <a:latin typeface="Times New Roman" panose="02020603050405020304" pitchFamily="18" charset="0"/>
+                <a:cs typeface="Times New Roman" panose="02020603050405020304" pitchFamily="18" charset="0"/>
+              </a:rPr>
+              <a:t>tính</a:t>
+            </a:r>
+            <a:r>
+              <a:rPr lang="en-US" sz="3000" dirty="0">
+                <a:solidFill>
+                  <a:schemeClr val="tx1"/>
+                </a:solidFill>
+                <a:latin typeface="Times New Roman" panose="02020603050405020304" pitchFamily="18" charset="0"/>
+                <a:cs typeface="Times New Roman" panose="02020603050405020304" pitchFamily="18" charset="0"/>
+              </a:rPr>
+              <a:t> </a:t>
+            </a:r>
+            <a:r>
+              <a:rPr lang="en-US" sz="3000" dirty="0" err="1">
+                <a:solidFill>
+                  <a:schemeClr val="tx1"/>
+                </a:solidFill>
+                <a:latin typeface="Times New Roman" panose="02020603050405020304" pitchFamily="18" charset="0"/>
+                <a:cs typeface="Times New Roman" panose="02020603050405020304" pitchFamily="18" charset="0"/>
+              </a:rPr>
+              <a:t>năng</a:t>
+            </a:r>
+            <a:r>
+              <a:rPr lang="en-US" sz="3000" dirty="0">
+                <a:solidFill>
+                  <a:schemeClr val="tx1"/>
+                </a:solidFill>
+                <a:latin typeface="Times New Roman" panose="02020603050405020304" pitchFamily="18" charset="0"/>
+                <a:cs typeface="Times New Roman" panose="02020603050405020304" pitchFamily="18" charset="0"/>
+              </a:rPr>
+              <a:t> </a:t>
+            </a:r>
+            <a:r>
+              <a:rPr lang="en-US" sz="3000" dirty="0" err="1">
+                <a:solidFill>
+                  <a:schemeClr val="tx1"/>
+                </a:solidFill>
+                <a:latin typeface="Times New Roman" panose="02020603050405020304" pitchFamily="18" charset="0"/>
+                <a:cs typeface="Times New Roman" panose="02020603050405020304" pitchFamily="18" charset="0"/>
+              </a:rPr>
+              <a:t>cân</a:t>
+            </a:r>
+            <a:r>
+              <a:rPr lang="en-US" sz="3000" dirty="0">
+                <a:solidFill>
+                  <a:schemeClr val="tx1"/>
+                </a:solidFill>
+                <a:latin typeface="Times New Roman" panose="02020603050405020304" pitchFamily="18" charset="0"/>
+                <a:cs typeface="Times New Roman" panose="02020603050405020304" pitchFamily="18" charset="0"/>
+              </a:rPr>
+              <a:t> </a:t>
+            </a:r>
+            <a:r>
+              <a:rPr lang="en-US" sz="3000" dirty="0" err="1">
+                <a:solidFill>
+                  <a:schemeClr val="tx1"/>
+                </a:solidFill>
+                <a:latin typeface="Times New Roman" panose="02020603050405020304" pitchFamily="18" charset="0"/>
+                <a:cs typeface="Times New Roman" panose="02020603050405020304" pitchFamily="18" charset="0"/>
+              </a:rPr>
+              <a:t>điện</a:t>
+            </a:r>
+            <a:r>
+              <a:rPr lang="en-US" sz="3000" dirty="0">
+                <a:solidFill>
+                  <a:schemeClr val="tx1"/>
+                </a:solidFill>
+                <a:latin typeface="Times New Roman" panose="02020603050405020304" pitchFamily="18" charset="0"/>
+                <a:cs typeface="Times New Roman" panose="02020603050405020304" pitchFamily="18" charset="0"/>
+              </a:rPr>
+              <a:t> </a:t>
+            </a:r>
+            <a:r>
+              <a:rPr lang="en-US" sz="3000" dirty="0" err="1">
+                <a:solidFill>
+                  <a:schemeClr val="tx1"/>
+                </a:solidFill>
+                <a:latin typeface="Times New Roman" panose="02020603050405020304" pitchFamily="18" charset="0"/>
+                <a:cs typeface="Times New Roman" panose="02020603050405020304" pitchFamily="18" charset="0"/>
+              </a:rPr>
+              <a:t>tử</a:t>
+            </a:r>
+            <a:r>
+              <a:rPr lang="en-US" sz="3000" dirty="0">
+                <a:solidFill>
+                  <a:schemeClr val="tx1"/>
+                </a:solidFill>
+                <a:latin typeface="Times New Roman" panose="02020603050405020304" pitchFamily="18" charset="0"/>
+                <a:cs typeface="Times New Roman" panose="02020603050405020304" pitchFamily="18" charset="0"/>
+              </a:rPr>
+              <a:t>, </a:t>
+            </a:r>
+            <a:r>
+              <a:rPr lang="en-US" sz="3000" dirty="0" err="1">
+                <a:solidFill>
+                  <a:schemeClr val="tx1"/>
+                </a:solidFill>
+                <a:latin typeface="Times New Roman" panose="02020603050405020304" pitchFamily="18" charset="0"/>
+                <a:cs typeface="Times New Roman" panose="02020603050405020304" pitchFamily="18" charset="0"/>
+              </a:rPr>
+              <a:t>tích</a:t>
+            </a:r>
+            <a:r>
+              <a:rPr lang="en-US" sz="3000" dirty="0">
+                <a:solidFill>
+                  <a:schemeClr val="tx1"/>
+                </a:solidFill>
+                <a:latin typeface="Times New Roman" panose="02020603050405020304" pitchFamily="18" charset="0"/>
+                <a:cs typeface="Times New Roman" panose="02020603050405020304" pitchFamily="18" charset="0"/>
+              </a:rPr>
+              <a:t> </a:t>
+            </a:r>
+            <a:r>
+              <a:rPr lang="en-US" sz="3000" dirty="0" err="1">
+                <a:solidFill>
+                  <a:schemeClr val="tx1"/>
+                </a:solidFill>
+                <a:latin typeface="Times New Roman" panose="02020603050405020304" pitchFamily="18" charset="0"/>
+                <a:cs typeface="Times New Roman" panose="02020603050405020304" pitchFamily="18" charset="0"/>
+              </a:rPr>
+              <a:t>lũy</a:t>
+            </a:r>
+            <a:r>
+              <a:rPr lang="en-US" sz="3000" dirty="0">
+                <a:solidFill>
+                  <a:schemeClr val="tx1"/>
+                </a:solidFill>
+                <a:latin typeface="Times New Roman" panose="02020603050405020304" pitchFamily="18" charset="0"/>
+                <a:cs typeface="Times New Roman" panose="02020603050405020304" pitchFamily="18" charset="0"/>
+              </a:rPr>
+              <a:t> </a:t>
+            </a:r>
+            <a:r>
+              <a:rPr lang="en-US" sz="3000" dirty="0" err="1">
+                <a:solidFill>
+                  <a:schemeClr val="tx1"/>
+                </a:solidFill>
+                <a:latin typeface="Times New Roman" panose="02020603050405020304" pitchFamily="18" charset="0"/>
+                <a:cs typeface="Times New Roman" panose="02020603050405020304" pitchFamily="18" charset="0"/>
+              </a:rPr>
+              <a:t>điểm</a:t>
+            </a:r>
+            <a:r>
+              <a:rPr lang="en-US" sz="3000" dirty="0">
+                <a:solidFill>
+                  <a:schemeClr val="tx1"/>
+                </a:solidFill>
+                <a:latin typeface="Times New Roman" panose="02020603050405020304" pitchFamily="18" charset="0"/>
+                <a:cs typeface="Times New Roman" panose="02020603050405020304" pitchFamily="18" charset="0"/>
+              </a:rPr>
+              <a:t> </a:t>
+            </a:r>
+            <a:r>
+              <a:rPr lang="en-US" sz="3000" dirty="0" err="1">
+                <a:solidFill>
+                  <a:schemeClr val="tx1"/>
+                </a:solidFill>
+                <a:latin typeface="Times New Roman" panose="02020603050405020304" pitchFamily="18" charset="0"/>
+                <a:cs typeface="Times New Roman" panose="02020603050405020304" pitchFamily="18" charset="0"/>
+              </a:rPr>
+              <a:t>thưởng</a:t>
+            </a:r>
+            <a:r>
+              <a:rPr lang="en-US" sz="3000" dirty="0">
+                <a:solidFill>
+                  <a:schemeClr val="tx1"/>
+                </a:solidFill>
+                <a:latin typeface="Times New Roman" panose="02020603050405020304" pitchFamily="18" charset="0"/>
+                <a:cs typeface="Times New Roman" panose="02020603050405020304" pitchFamily="18" charset="0"/>
+              </a:rPr>
+              <a:t> </a:t>
+            </a:r>
+            <a:r>
+              <a:rPr lang="en-US" sz="3000" dirty="0" err="1">
+                <a:solidFill>
+                  <a:schemeClr val="tx1"/>
+                </a:solidFill>
+                <a:latin typeface="Times New Roman" panose="02020603050405020304" pitchFamily="18" charset="0"/>
+                <a:cs typeface="Times New Roman" panose="02020603050405020304" pitchFamily="18" charset="0"/>
+              </a:rPr>
+              <a:t>cho</a:t>
+            </a:r>
+            <a:r>
+              <a:rPr lang="en-US" sz="3000" dirty="0">
+                <a:solidFill>
+                  <a:schemeClr val="tx1"/>
+                </a:solidFill>
+                <a:latin typeface="Times New Roman" panose="02020603050405020304" pitchFamily="18" charset="0"/>
+                <a:cs typeface="Times New Roman" panose="02020603050405020304" pitchFamily="18" charset="0"/>
+              </a:rPr>
+              <a:t> </a:t>
+            </a:r>
+            <a:r>
+              <a:rPr lang="en-US" sz="3000" dirty="0" err="1">
+                <a:solidFill>
+                  <a:schemeClr val="tx1"/>
+                </a:solidFill>
+                <a:latin typeface="Times New Roman" panose="02020603050405020304" pitchFamily="18" charset="0"/>
+                <a:cs typeface="Times New Roman" panose="02020603050405020304" pitchFamily="18" charset="0"/>
+              </a:rPr>
+              <a:t>khách</a:t>
+            </a:r>
+            <a:r>
+              <a:rPr lang="en-US" sz="3000" dirty="0">
+                <a:solidFill>
+                  <a:schemeClr val="tx1"/>
+                </a:solidFill>
+                <a:latin typeface="Times New Roman" panose="02020603050405020304" pitchFamily="18" charset="0"/>
+                <a:cs typeface="Times New Roman" panose="02020603050405020304" pitchFamily="18" charset="0"/>
+              </a:rPr>
+              <a:t> </a:t>
+            </a:r>
+            <a:r>
+              <a:rPr lang="en-US" sz="3000" dirty="0" err="1">
+                <a:solidFill>
+                  <a:schemeClr val="tx1"/>
+                </a:solidFill>
+                <a:latin typeface="Times New Roman" panose="02020603050405020304" pitchFamily="18" charset="0"/>
+                <a:cs typeface="Times New Roman" panose="02020603050405020304" pitchFamily="18" charset="0"/>
+              </a:rPr>
+              <a:t>hàng</a:t>
+            </a:r>
+            <a:r>
+              <a:rPr lang="en-US" sz="3000" dirty="0">
+                <a:solidFill>
+                  <a:schemeClr val="tx1"/>
+                </a:solidFill>
+                <a:latin typeface="Times New Roman" panose="02020603050405020304" pitchFamily="18" charset="0"/>
+                <a:cs typeface="Times New Roman" panose="02020603050405020304" pitchFamily="18" charset="0"/>
+              </a:rPr>
+              <a:t>.</a:t>
+            </a:r>
+          </a:p>
+          <a:p>
+            <a:pPr marL="285750" lvl="0" indent="-285750">
+              <a:buFont typeface="Wingdings" panose="05000000000000000000" pitchFamily="2" charset="2"/>
+              <a:buChar char="Ø"/>
+            </a:pPr>
+            <a:r>
+              <a:rPr lang="en-US" sz="3000" dirty="0" err="1">
+                <a:solidFill>
+                  <a:schemeClr val="tx1"/>
+                </a:solidFill>
+                <a:latin typeface="Times New Roman" panose="02020603050405020304" pitchFamily="18" charset="0"/>
+                <a:cs typeface="Times New Roman" panose="02020603050405020304" pitchFamily="18" charset="0"/>
+              </a:rPr>
+              <a:t>Xây</a:t>
+            </a:r>
+            <a:r>
+              <a:rPr lang="en-US" sz="3000" dirty="0">
+                <a:solidFill>
+                  <a:schemeClr val="tx1"/>
+                </a:solidFill>
+                <a:latin typeface="Times New Roman" panose="02020603050405020304" pitchFamily="18" charset="0"/>
+                <a:cs typeface="Times New Roman" panose="02020603050405020304" pitchFamily="18" charset="0"/>
+              </a:rPr>
+              <a:t> </a:t>
+            </a:r>
+            <a:r>
+              <a:rPr lang="en-US" sz="3000" dirty="0" err="1">
+                <a:solidFill>
+                  <a:schemeClr val="tx1"/>
+                </a:solidFill>
+                <a:latin typeface="Times New Roman" panose="02020603050405020304" pitchFamily="18" charset="0"/>
+                <a:cs typeface="Times New Roman" panose="02020603050405020304" pitchFamily="18" charset="0"/>
+              </a:rPr>
+              <a:t>dựng</a:t>
+            </a:r>
+            <a:r>
+              <a:rPr lang="en-US" sz="3000" dirty="0">
+                <a:solidFill>
+                  <a:schemeClr val="tx1"/>
+                </a:solidFill>
+                <a:latin typeface="Times New Roman" panose="02020603050405020304" pitchFamily="18" charset="0"/>
+                <a:cs typeface="Times New Roman" panose="02020603050405020304" pitchFamily="18" charset="0"/>
+              </a:rPr>
+              <a:t> </a:t>
+            </a:r>
+            <a:r>
+              <a:rPr lang="en-US" sz="3000" dirty="0" err="1">
+                <a:solidFill>
+                  <a:schemeClr val="tx1"/>
+                </a:solidFill>
+                <a:latin typeface="Times New Roman" panose="02020603050405020304" pitchFamily="18" charset="0"/>
+                <a:cs typeface="Times New Roman" panose="02020603050405020304" pitchFamily="18" charset="0"/>
+              </a:rPr>
+              <a:t>chương</a:t>
+            </a:r>
+            <a:r>
+              <a:rPr lang="en-US" sz="3000" dirty="0">
+                <a:solidFill>
+                  <a:schemeClr val="tx1"/>
+                </a:solidFill>
+                <a:latin typeface="Times New Roman" panose="02020603050405020304" pitchFamily="18" charset="0"/>
+                <a:cs typeface="Times New Roman" panose="02020603050405020304" pitchFamily="18" charset="0"/>
+              </a:rPr>
+              <a:t> </a:t>
+            </a:r>
+            <a:r>
+              <a:rPr lang="en-US" sz="3000" dirty="0" err="1">
+                <a:solidFill>
+                  <a:schemeClr val="tx1"/>
+                </a:solidFill>
+                <a:latin typeface="Times New Roman" panose="02020603050405020304" pitchFamily="18" charset="0"/>
+                <a:cs typeface="Times New Roman" panose="02020603050405020304" pitchFamily="18" charset="0"/>
+              </a:rPr>
+              <a:t>trình</a:t>
+            </a:r>
+            <a:r>
+              <a:rPr lang="en-US" sz="3000" dirty="0">
+                <a:solidFill>
+                  <a:schemeClr val="tx1"/>
+                </a:solidFill>
+                <a:latin typeface="Times New Roman" panose="02020603050405020304" pitchFamily="18" charset="0"/>
+                <a:cs typeface="Times New Roman" panose="02020603050405020304" pitchFamily="18" charset="0"/>
+              </a:rPr>
+              <a:t> </a:t>
+            </a:r>
+            <a:r>
+              <a:rPr lang="en-US" sz="3000" dirty="0" err="1">
+                <a:solidFill>
+                  <a:schemeClr val="tx1"/>
+                </a:solidFill>
+                <a:latin typeface="Times New Roman" panose="02020603050405020304" pitchFamily="18" charset="0"/>
+                <a:cs typeface="Times New Roman" panose="02020603050405020304" pitchFamily="18" charset="0"/>
+              </a:rPr>
+              <a:t>quản</a:t>
+            </a:r>
+            <a:r>
+              <a:rPr lang="en-US" sz="3000" dirty="0">
+                <a:solidFill>
+                  <a:schemeClr val="tx1"/>
+                </a:solidFill>
+                <a:latin typeface="Times New Roman" panose="02020603050405020304" pitchFamily="18" charset="0"/>
+                <a:cs typeface="Times New Roman" panose="02020603050405020304" pitchFamily="18" charset="0"/>
+              </a:rPr>
+              <a:t> </a:t>
+            </a:r>
+            <a:r>
+              <a:rPr lang="en-US" sz="3000" dirty="0" err="1">
+                <a:solidFill>
+                  <a:schemeClr val="tx1"/>
+                </a:solidFill>
+                <a:latin typeface="Times New Roman" panose="02020603050405020304" pitchFamily="18" charset="0"/>
+                <a:cs typeface="Times New Roman" panose="02020603050405020304" pitchFamily="18" charset="0"/>
+              </a:rPr>
+              <a:t>lý</a:t>
+            </a:r>
+            <a:r>
+              <a:rPr lang="en-US" sz="3000" dirty="0">
+                <a:solidFill>
+                  <a:schemeClr val="tx1"/>
+                </a:solidFill>
+                <a:latin typeface="Times New Roman" panose="02020603050405020304" pitchFamily="18" charset="0"/>
+                <a:cs typeface="Times New Roman" panose="02020603050405020304" pitchFamily="18" charset="0"/>
+              </a:rPr>
+              <a:t> </a:t>
+            </a:r>
+            <a:r>
+              <a:rPr lang="en-US" sz="3000" dirty="0" err="1">
+                <a:solidFill>
+                  <a:schemeClr val="tx1"/>
+                </a:solidFill>
+                <a:latin typeface="Times New Roman" panose="02020603050405020304" pitchFamily="18" charset="0"/>
+                <a:cs typeface="Times New Roman" panose="02020603050405020304" pitchFamily="18" charset="0"/>
+              </a:rPr>
+              <a:t>các</a:t>
+            </a:r>
+            <a:r>
+              <a:rPr lang="en-US" sz="3000" dirty="0">
+                <a:solidFill>
+                  <a:schemeClr val="tx1"/>
+                </a:solidFill>
+                <a:latin typeface="Times New Roman" panose="02020603050405020304" pitchFamily="18" charset="0"/>
+                <a:cs typeface="Times New Roman" panose="02020603050405020304" pitchFamily="18" charset="0"/>
+              </a:rPr>
+              <a:t> </a:t>
+            </a:r>
+            <a:r>
+              <a:rPr lang="en-US" sz="3000" dirty="0" err="1">
+                <a:solidFill>
+                  <a:schemeClr val="tx1"/>
+                </a:solidFill>
+                <a:latin typeface="Times New Roman" panose="02020603050405020304" pitchFamily="18" charset="0"/>
+                <a:cs typeface="Times New Roman" panose="02020603050405020304" pitchFamily="18" charset="0"/>
+              </a:rPr>
+              <a:t>siêu</a:t>
+            </a:r>
+            <a:r>
+              <a:rPr lang="en-US" sz="3000" dirty="0">
+                <a:solidFill>
+                  <a:schemeClr val="tx1"/>
+                </a:solidFill>
+                <a:latin typeface="Times New Roman" panose="02020603050405020304" pitchFamily="18" charset="0"/>
+                <a:cs typeface="Times New Roman" panose="02020603050405020304" pitchFamily="18" charset="0"/>
+              </a:rPr>
+              <a:t> </a:t>
+            </a:r>
+            <a:r>
+              <a:rPr lang="en-US" sz="3000" dirty="0" err="1">
+                <a:solidFill>
+                  <a:schemeClr val="tx1"/>
+                </a:solidFill>
+                <a:latin typeface="Times New Roman" panose="02020603050405020304" pitchFamily="18" charset="0"/>
+                <a:cs typeface="Times New Roman" panose="02020603050405020304" pitchFamily="18" charset="0"/>
+              </a:rPr>
+              <a:t>thị</a:t>
+            </a:r>
+            <a:r>
+              <a:rPr lang="en-US" sz="3000" dirty="0">
+                <a:solidFill>
+                  <a:schemeClr val="tx1"/>
+                </a:solidFill>
+                <a:latin typeface="Times New Roman" panose="02020603050405020304" pitchFamily="18" charset="0"/>
+                <a:cs typeface="Times New Roman" panose="02020603050405020304" pitchFamily="18" charset="0"/>
+              </a:rPr>
+              <a:t>, </a:t>
+            </a:r>
+            <a:r>
+              <a:rPr lang="en-US" sz="3000" dirty="0" err="1">
+                <a:solidFill>
+                  <a:schemeClr val="tx1"/>
+                </a:solidFill>
+                <a:latin typeface="Times New Roman" panose="02020603050405020304" pitchFamily="18" charset="0"/>
+                <a:cs typeface="Times New Roman" panose="02020603050405020304" pitchFamily="18" charset="0"/>
+              </a:rPr>
+              <a:t>cửa</a:t>
+            </a:r>
+            <a:r>
+              <a:rPr lang="en-US" sz="3000" dirty="0">
+                <a:solidFill>
+                  <a:schemeClr val="tx1"/>
+                </a:solidFill>
+                <a:latin typeface="Times New Roman" panose="02020603050405020304" pitchFamily="18" charset="0"/>
+                <a:cs typeface="Times New Roman" panose="02020603050405020304" pitchFamily="18" charset="0"/>
+              </a:rPr>
+              <a:t> </a:t>
+            </a:r>
+            <a:r>
+              <a:rPr lang="en-US" sz="3000" dirty="0" err="1">
+                <a:solidFill>
+                  <a:schemeClr val="tx1"/>
+                </a:solidFill>
+                <a:latin typeface="Times New Roman" panose="02020603050405020304" pitchFamily="18" charset="0"/>
+                <a:cs typeface="Times New Roman" panose="02020603050405020304" pitchFamily="18" charset="0"/>
+              </a:rPr>
+              <a:t>hàng</a:t>
+            </a:r>
+            <a:r>
+              <a:rPr lang="en-US" sz="3000" dirty="0">
+                <a:solidFill>
+                  <a:schemeClr val="tx1"/>
+                </a:solidFill>
+                <a:latin typeface="Times New Roman" panose="02020603050405020304" pitchFamily="18" charset="0"/>
+                <a:cs typeface="Times New Roman" panose="02020603050405020304" pitchFamily="18" charset="0"/>
+              </a:rPr>
+              <a:t>.</a:t>
+            </a:r>
+          </a:p>
+          <a:p>
+            <a:pPr marL="285750" indent="-285750">
+              <a:buFont typeface="Wingdings" panose="05000000000000000000" pitchFamily="2" charset="2"/>
+              <a:buChar char="Ø"/>
+            </a:pPr>
+            <a:r>
+              <a:rPr lang="en-US" sz="3000" dirty="0" err="1">
+                <a:solidFill>
+                  <a:schemeClr val="tx1"/>
+                </a:solidFill>
+                <a:latin typeface="Times New Roman" panose="02020603050405020304" pitchFamily="18" charset="0"/>
+                <a:cs typeface="Times New Roman" panose="02020603050405020304" pitchFamily="18" charset="0"/>
+              </a:rPr>
+              <a:t>Rà</a:t>
+            </a:r>
+            <a:r>
+              <a:rPr lang="en-US" sz="3000" dirty="0">
+                <a:solidFill>
+                  <a:schemeClr val="tx1"/>
+                </a:solidFill>
+                <a:latin typeface="Times New Roman" panose="02020603050405020304" pitchFamily="18" charset="0"/>
+                <a:cs typeface="Times New Roman" panose="02020603050405020304" pitchFamily="18" charset="0"/>
+              </a:rPr>
+              <a:t> </a:t>
+            </a:r>
+            <a:r>
+              <a:rPr lang="en-US" sz="3000" dirty="0" err="1">
+                <a:solidFill>
+                  <a:schemeClr val="tx1"/>
+                </a:solidFill>
+                <a:latin typeface="Times New Roman" panose="02020603050405020304" pitchFamily="18" charset="0"/>
+                <a:cs typeface="Times New Roman" panose="02020603050405020304" pitchFamily="18" charset="0"/>
+              </a:rPr>
+              <a:t>soát</a:t>
+            </a:r>
+            <a:r>
+              <a:rPr lang="en-US" sz="3000" dirty="0">
+                <a:solidFill>
+                  <a:schemeClr val="tx1"/>
+                </a:solidFill>
+                <a:latin typeface="Times New Roman" panose="02020603050405020304" pitchFamily="18" charset="0"/>
+                <a:cs typeface="Times New Roman" panose="02020603050405020304" pitchFamily="18" charset="0"/>
+              </a:rPr>
+              <a:t> </a:t>
+            </a:r>
+            <a:r>
+              <a:rPr lang="en-US" sz="3000" dirty="0" err="1">
+                <a:solidFill>
+                  <a:schemeClr val="tx1"/>
+                </a:solidFill>
+                <a:latin typeface="Times New Roman" panose="02020603050405020304" pitchFamily="18" charset="0"/>
+                <a:cs typeface="Times New Roman" panose="02020603050405020304" pitchFamily="18" charset="0"/>
+              </a:rPr>
+              <a:t>khắc</a:t>
+            </a:r>
+            <a:r>
+              <a:rPr lang="en-US" sz="3000" dirty="0">
+                <a:solidFill>
+                  <a:schemeClr val="tx1"/>
+                </a:solidFill>
+                <a:latin typeface="Times New Roman" panose="02020603050405020304" pitchFamily="18" charset="0"/>
+                <a:cs typeface="Times New Roman" panose="02020603050405020304" pitchFamily="18" charset="0"/>
+              </a:rPr>
+              <a:t> </a:t>
+            </a:r>
+            <a:r>
+              <a:rPr lang="en-US" sz="3000" dirty="0" err="1">
+                <a:solidFill>
+                  <a:schemeClr val="tx1"/>
+                </a:solidFill>
+                <a:latin typeface="Times New Roman" panose="02020603050405020304" pitchFamily="18" charset="0"/>
+                <a:cs typeface="Times New Roman" panose="02020603050405020304" pitchFamily="18" charset="0"/>
+              </a:rPr>
+              <a:t>phục</a:t>
+            </a:r>
+            <a:r>
+              <a:rPr lang="en-US" sz="3000" dirty="0">
+                <a:solidFill>
+                  <a:schemeClr val="tx1"/>
+                </a:solidFill>
+                <a:latin typeface="Times New Roman" panose="02020603050405020304" pitchFamily="18" charset="0"/>
+                <a:cs typeface="Times New Roman" panose="02020603050405020304" pitchFamily="18" charset="0"/>
+              </a:rPr>
+              <a:t> </a:t>
+            </a:r>
+            <a:r>
+              <a:rPr lang="en-US" sz="3000" dirty="0" err="1">
+                <a:solidFill>
+                  <a:schemeClr val="tx1"/>
+                </a:solidFill>
+                <a:latin typeface="Times New Roman" panose="02020603050405020304" pitchFamily="18" charset="0"/>
+                <a:cs typeface="Times New Roman" panose="02020603050405020304" pitchFamily="18" charset="0"/>
+              </a:rPr>
+              <a:t>các</a:t>
+            </a:r>
+            <a:r>
+              <a:rPr lang="en-US" sz="3000" dirty="0">
+                <a:solidFill>
+                  <a:schemeClr val="tx1"/>
+                </a:solidFill>
+                <a:latin typeface="Times New Roman" panose="02020603050405020304" pitchFamily="18" charset="0"/>
+                <a:cs typeface="Times New Roman" panose="02020603050405020304" pitchFamily="18" charset="0"/>
+              </a:rPr>
+              <a:t> </a:t>
+            </a:r>
+            <a:r>
+              <a:rPr lang="en-US" sz="3000" dirty="0" err="1">
+                <a:solidFill>
+                  <a:schemeClr val="tx1"/>
+                </a:solidFill>
+                <a:latin typeface="Times New Roman" panose="02020603050405020304" pitchFamily="18" charset="0"/>
+                <a:cs typeface="Times New Roman" panose="02020603050405020304" pitchFamily="18" charset="0"/>
+              </a:rPr>
+              <a:t>lỗi</a:t>
+            </a:r>
+            <a:r>
+              <a:rPr lang="en-US" sz="3000" dirty="0">
+                <a:solidFill>
+                  <a:schemeClr val="tx1"/>
+                </a:solidFill>
+                <a:latin typeface="Times New Roman" panose="02020603050405020304" pitchFamily="18" charset="0"/>
+                <a:cs typeface="Times New Roman" panose="02020603050405020304" pitchFamily="18" charset="0"/>
+              </a:rPr>
+              <a:t> ở </a:t>
+            </a:r>
+            <a:r>
+              <a:rPr lang="en-US" sz="3000" dirty="0" err="1">
+                <a:solidFill>
+                  <a:schemeClr val="tx1"/>
+                </a:solidFill>
+                <a:latin typeface="Times New Roman" panose="02020603050405020304" pitchFamily="18" charset="0"/>
+                <a:cs typeface="Times New Roman" panose="02020603050405020304" pitchFamily="18" charset="0"/>
+              </a:rPr>
+              <a:t>phiên</a:t>
+            </a:r>
+            <a:r>
+              <a:rPr lang="en-US" sz="3000" dirty="0">
+                <a:solidFill>
+                  <a:schemeClr val="tx1"/>
+                </a:solidFill>
+                <a:latin typeface="Times New Roman" panose="02020603050405020304" pitchFamily="18" charset="0"/>
+                <a:cs typeface="Times New Roman" panose="02020603050405020304" pitchFamily="18" charset="0"/>
+              </a:rPr>
+              <a:t> </a:t>
+            </a:r>
+            <a:r>
+              <a:rPr lang="en-US" sz="3000" dirty="0" err="1">
+                <a:solidFill>
+                  <a:schemeClr val="tx1"/>
+                </a:solidFill>
+                <a:latin typeface="Times New Roman" panose="02020603050405020304" pitchFamily="18" charset="0"/>
+                <a:cs typeface="Times New Roman" panose="02020603050405020304" pitchFamily="18" charset="0"/>
+              </a:rPr>
+              <a:t>bản</a:t>
+            </a:r>
+            <a:r>
+              <a:rPr lang="en-US" sz="3000" dirty="0">
+                <a:solidFill>
+                  <a:schemeClr val="tx1"/>
+                </a:solidFill>
+                <a:latin typeface="Times New Roman" panose="02020603050405020304" pitchFamily="18" charset="0"/>
+                <a:cs typeface="Times New Roman" panose="02020603050405020304" pitchFamily="18" charset="0"/>
+              </a:rPr>
+              <a:t> </a:t>
+            </a:r>
+            <a:r>
+              <a:rPr lang="en-US" sz="3000" dirty="0" err="1">
+                <a:solidFill>
+                  <a:schemeClr val="tx1"/>
+                </a:solidFill>
+                <a:latin typeface="Times New Roman" panose="02020603050405020304" pitchFamily="18" charset="0"/>
+                <a:cs typeface="Times New Roman" panose="02020603050405020304" pitchFamily="18" charset="0"/>
+              </a:rPr>
+              <a:t>hiện</a:t>
+            </a:r>
+            <a:r>
+              <a:rPr lang="en-US" sz="3000" dirty="0">
+                <a:solidFill>
+                  <a:schemeClr val="tx1"/>
+                </a:solidFill>
+                <a:latin typeface="Times New Roman" panose="02020603050405020304" pitchFamily="18" charset="0"/>
+                <a:cs typeface="Times New Roman" panose="02020603050405020304" pitchFamily="18" charset="0"/>
+              </a:rPr>
+              <a:t> </a:t>
+            </a:r>
+            <a:r>
+              <a:rPr lang="en-US" sz="3000" dirty="0" err="1">
+                <a:solidFill>
+                  <a:schemeClr val="tx1"/>
+                </a:solidFill>
+                <a:latin typeface="Times New Roman" panose="02020603050405020304" pitchFamily="18" charset="0"/>
+                <a:cs typeface="Times New Roman" panose="02020603050405020304" pitchFamily="18" charset="0"/>
+              </a:rPr>
+              <a:t>tại</a:t>
+            </a:r>
+            <a:r>
+              <a:rPr lang="en-US" sz="3000" dirty="0">
+                <a:solidFill>
+                  <a:schemeClr val="tx1"/>
+                </a:solidFill>
+                <a:latin typeface="Times New Roman" panose="02020603050405020304" pitchFamily="18" charset="0"/>
+                <a:cs typeface="Times New Roman" panose="02020603050405020304" pitchFamily="18" charset="0"/>
+              </a:rPr>
+              <a:t>.</a:t>
+            </a:r>
+            <a:endParaRPr lang="en-US" sz="2800" dirty="0">
+              <a:solidFill>
+                <a:schemeClr val="tx1"/>
+              </a:solidFill>
+              <a:latin typeface="Times New Roman" panose="02020603050405020304" pitchFamily="18" charset="0"/>
+              <a:cs typeface="Times New Roman" panose="02020603050405020304" pitchFamily="18" charset="0"/>
+            </a:endParaRPr>
+          </a:p>
+          <a:p>
+            <a:endParaRPr lang="en-US" sz="2800" b="1" dirty="0">
+              <a:solidFill>
+                <a:schemeClr val="tx1"/>
+              </a:solidFill>
+              <a:latin typeface="Times New Roman" panose="02020603050405020304" pitchFamily="18" charset="0"/>
+              <a:cs typeface="Times New Roman" panose="02020603050405020304" pitchFamily="18" charset="0"/>
+            </a:endParaRPr>
+          </a:p>
+        </p:txBody>
+      </p:sp>
+    </p:spTree>
+    <p:extLst>
+      <p:ext uri="{BB962C8B-B14F-4D97-AF65-F5344CB8AC3E}">
+        <p14:creationId xmlns:p14="http://schemas.microsoft.com/office/powerpoint/2010/main" val="1067851641"/>
+      </p:ext>
+    </p:extLst>
+  </p:cSld>
+  <p:clrMapOvr>
+    <a:masterClrMapping/>
+  </p:clrMapOvr>
+</p:sld>
+</file>
+
 <file path=ppt/slides/slide2.xml><?xml version="1.0" encoding="utf-8"?>
 <p:sld xmlns:a="http://schemas.openxmlformats.org/drawingml/2006/main" xmlns:r="http://schemas.openxmlformats.org/officeDocument/2006/relationships" xmlns:p="http://schemas.openxmlformats.org/presentationml/2006/main">
   <p:cSld>

</xml_diff>